<commit_message>
atualização nos slides da apresentação do projeto 2.0
</commit_message>
<xml_diff>
--- a/trabalho-final-modulo-4.3-4.4.pptx
+++ b/trabalho-final-modulo-4.3-4.4.pptx
@@ -19,8 +19,10 @@
     <p:sldId id="266" r:id="rId16"/>
     <p:sldId id="267" r:id="rId17"/>
     <p:sldId id="268" r:id="rId18"/>
-    <p:sldId id="269" r:id="rId19"/>
-    <p:sldId id="259" r:id="rId20"/>
+    <p:sldId id="276" r:id="rId19"/>
+    <p:sldId id="275" r:id="rId20"/>
+    <p:sldId id="269" r:id="rId21"/>
+    <p:sldId id="259" r:id="rId22"/>
   </p:sldIdLst>
   <p:sldSz cx="12192000" cy="6858000"/>
   <p:notesSz cx="6858000" cy="9144000"/>
@@ -130,7 +132,7 @@
 <file path=ppt/revisionInfo.xml><?xml version="1.0" encoding="utf-8"?>
 <p1510:revInfo xmlns:a="http://schemas.openxmlformats.org/drawingml/2006/main" xmlns:r="http://schemas.openxmlformats.org/officeDocument/2006/relationships" xmlns:p1510="http://schemas.microsoft.com/office/powerpoint/2015/10/main">
   <p1510:revLst>
-    <p1510:client id="{1F201303-0C17-38E5-2881-2E2CB0D9B721}" v="2761" dt="2022-11-25T05:14:05.351"/>
+    <p1510:client id="{1F201303-0C17-38E5-2881-2E2CB0D9B721}" v="3108" dt="2022-11-25T13:01:58.392"/>
     <p1510:client id="{58120D1B-048A-4E77-8BAB-7BF24A1970A4}" v="117" dt="2022-11-17T19:06:34.281"/>
   </p1510:revLst>
 </p1510:revInfo>
@@ -267,7 +269,7 @@
           <a:p>
             <a:fld id="{F0E51C7C-CEA3-4CAA-BE4B-344879E7C377}" type="datetimeFigureOut">
               <a:rPr lang="de-DE" smtClean="0"/>
-              <a:t>24.11.2022</a:t>
+              <a:t>25.11.2022</a:t>
             </a:fld>
             <a:endParaRPr lang="de-DE"/>
           </a:p>
@@ -437,7 +439,7 @@
           <a:p>
             <a:fld id="{F0E51C7C-CEA3-4CAA-BE4B-344879E7C377}" type="datetimeFigureOut">
               <a:rPr lang="de-DE" smtClean="0"/>
-              <a:t>24.11.2022</a:t>
+              <a:t>25.11.2022</a:t>
             </a:fld>
             <a:endParaRPr lang="de-DE"/>
           </a:p>
@@ -617,7 +619,7 @@
           <a:p>
             <a:fld id="{F0E51C7C-CEA3-4CAA-BE4B-344879E7C377}" type="datetimeFigureOut">
               <a:rPr lang="de-DE" smtClean="0"/>
-              <a:t>24.11.2022</a:t>
+              <a:t>25.11.2022</a:t>
             </a:fld>
             <a:endParaRPr lang="de-DE"/>
           </a:p>
@@ -787,7 +789,7 @@
           <a:p>
             <a:fld id="{F0E51C7C-CEA3-4CAA-BE4B-344879E7C377}" type="datetimeFigureOut">
               <a:rPr lang="de-DE" smtClean="0"/>
-              <a:t>24.11.2022</a:t>
+              <a:t>25.11.2022</a:t>
             </a:fld>
             <a:endParaRPr lang="de-DE"/>
           </a:p>
@@ -1033,7 +1035,7 @@
           <a:p>
             <a:fld id="{F0E51C7C-CEA3-4CAA-BE4B-344879E7C377}" type="datetimeFigureOut">
               <a:rPr lang="de-DE" smtClean="0"/>
-              <a:t>24.11.2022</a:t>
+              <a:t>25.11.2022</a:t>
             </a:fld>
             <a:endParaRPr lang="de-DE"/>
           </a:p>
@@ -1265,7 +1267,7 @@
           <a:p>
             <a:fld id="{F0E51C7C-CEA3-4CAA-BE4B-344879E7C377}" type="datetimeFigureOut">
               <a:rPr lang="de-DE" smtClean="0"/>
-              <a:t>24.11.2022</a:t>
+              <a:t>25.11.2022</a:t>
             </a:fld>
             <a:endParaRPr lang="de-DE"/>
           </a:p>
@@ -1632,7 +1634,7 @@
           <a:p>
             <a:fld id="{F0E51C7C-CEA3-4CAA-BE4B-344879E7C377}" type="datetimeFigureOut">
               <a:rPr lang="de-DE" smtClean="0"/>
-              <a:t>24.11.2022</a:t>
+              <a:t>25.11.2022</a:t>
             </a:fld>
             <a:endParaRPr lang="de-DE"/>
           </a:p>
@@ -1750,7 +1752,7 @@
           <a:p>
             <a:fld id="{F0E51C7C-CEA3-4CAA-BE4B-344879E7C377}" type="datetimeFigureOut">
               <a:rPr lang="de-DE" smtClean="0"/>
-              <a:t>24.11.2022</a:t>
+              <a:t>25.11.2022</a:t>
             </a:fld>
             <a:endParaRPr lang="de-DE"/>
           </a:p>
@@ -1845,7 +1847,7 @@
           <a:p>
             <a:fld id="{F0E51C7C-CEA3-4CAA-BE4B-344879E7C377}" type="datetimeFigureOut">
               <a:rPr lang="de-DE" smtClean="0"/>
-              <a:t>24.11.2022</a:t>
+              <a:t>25.11.2022</a:t>
             </a:fld>
             <a:endParaRPr lang="de-DE"/>
           </a:p>
@@ -2122,7 +2124,7 @@
           <a:p>
             <a:fld id="{F0E51C7C-CEA3-4CAA-BE4B-344879E7C377}" type="datetimeFigureOut">
               <a:rPr lang="de-DE" smtClean="0"/>
-              <a:t>24.11.2022</a:t>
+              <a:t>25.11.2022</a:t>
             </a:fld>
             <a:endParaRPr lang="de-DE"/>
           </a:p>
@@ -2375,7 +2377,7 @@
           <a:p>
             <a:fld id="{F0E51C7C-CEA3-4CAA-BE4B-344879E7C377}" type="datetimeFigureOut">
               <a:rPr lang="de-DE" smtClean="0"/>
-              <a:t>24.11.2022</a:t>
+              <a:t>25.11.2022</a:t>
             </a:fld>
             <a:endParaRPr lang="de-DE"/>
           </a:p>
@@ -2588,7 +2590,7 @@
           <a:p>
             <a:fld id="{F0E51C7C-CEA3-4CAA-BE4B-344879E7C377}" type="datetimeFigureOut">
               <a:rPr lang="de-DE" smtClean="0"/>
-              <a:t>24.11.2022</a:t>
+              <a:t>25.11.2022</a:t>
             </a:fld>
             <a:endParaRPr lang="de-DE"/>
           </a:p>
@@ -8965,12 +8967,12 @@
         <p:spPr>
           <a:xfrm>
             <a:off x="4633240" y="810094"/>
-            <a:ext cx="6715272" cy="1209233"/>
+            <a:ext cx="6715272" cy="1694142"/>
           </a:xfrm>
         </p:spPr>
         <p:txBody>
           <a:bodyPr vert="horz" lIns="91440" tIns="45720" rIns="91440" bIns="45720" rtlCol="0" anchor="t">
-            <a:normAutofit/>
+            <a:normAutofit fontScale="92500"/>
           </a:bodyPr>
           <a:lstStyle/>
           <a:p>
@@ -9111,7 +9113,55 @@
                 <a:ea typeface="Tahoma"/>
                 <a:cs typeface="Tahoma"/>
               </a:rPr>
-              <a:t> um email para </a:t>
+              <a:t> um email </a:t>
+            </a:r>
+            <a:r>
+              <a:rPr lang="en-US" sz="2000" dirty="0" err="1">
+                <a:latin typeface="Tahoma"/>
+                <a:ea typeface="Tahoma"/>
+                <a:cs typeface="Tahoma"/>
+              </a:rPr>
+              <a:t>todos</a:t>
+            </a:r>
+            <a:r>
+              <a:rPr lang="en-US" sz="2000" dirty="0">
+                <a:latin typeface="Tahoma"/>
+                <a:ea typeface="Tahoma"/>
+                <a:cs typeface="Tahoma"/>
+              </a:rPr>
+              <a:t> </a:t>
+            </a:r>
+            <a:r>
+              <a:rPr lang="en-US" sz="2000" dirty="0" err="1">
+                <a:latin typeface="Tahoma"/>
+                <a:ea typeface="Tahoma"/>
+                <a:cs typeface="Tahoma"/>
+              </a:rPr>
+              <a:t>os</a:t>
+            </a:r>
+            <a:r>
+              <a:rPr lang="en-US" sz="2000" dirty="0">
+                <a:latin typeface="Tahoma"/>
+                <a:ea typeface="Tahoma"/>
+                <a:cs typeface="Tahoma"/>
+              </a:rPr>
+              <a:t> </a:t>
+            </a:r>
+            <a:r>
+              <a:rPr lang="en-US" sz="2000" dirty="0" err="1">
+                <a:latin typeface="Tahoma"/>
+                <a:ea typeface="Tahoma"/>
+                <a:cs typeface="Tahoma"/>
+              </a:rPr>
+              <a:t>dias</a:t>
+            </a:r>
+            <a:r>
+              <a:rPr lang="en-US" sz="2000" dirty="0">
+                <a:latin typeface="Tahoma"/>
+                <a:ea typeface="Tahoma"/>
+                <a:cs typeface="Tahoma"/>
+              </a:rPr>
+              <a:t> para </a:t>
             </a:r>
             <a:r>
               <a:rPr lang="en-US" sz="2000" dirty="0" err="1">
@@ -9127,15 +9177,15 @@
                 <a:ea typeface="Tahoma"/>
                 <a:cs typeface="Tahoma"/>
               </a:rPr>
-              <a:t> um deles com </a:t>
-            </a:r>
-            <a:r>
-              <a:rPr lang="en-US" sz="2000" dirty="0" err="1">
-                <a:latin typeface="Tahoma"/>
-                <a:ea typeface="Tahoma"/>
-                <a:cs typeface="Tahoma"/>
-              </a:rPr>
-              <a:t>informações</a:t>
+              <a:t> um deles </a:t>
+            </a:r>
+            <a:r>
+              <a:rPr lang="en-US" sz="2000" dirty="0" err="1">
+                <a:latin typeface="Tahoma"/>
+                <a:ea typeface="Tahoma"/>
+                <a:cs typeface="Tahoma"/>
+              </a:rPr>
+              <a:t>informando</a:t>
             </a:r>
             <a:r>
               <a:rPr lang="en-US" sz="2000" dirty="0">
@@ -9151,7 +9201,7 @@
                 <a:ea typeface="Tahoma"/>
                 <a:cs typeface="Tahoma"/>
               </a:rPr>
-              <a:t>sobre</a:t>
+              <a:t>os</a:t>
             </a:r>
             <a:r>
               <a:rPr lang="en-US" sz="2000" dirty="0">
@@ -9167,7 +9217,7 @@
                 <a:ea typeface="Tahoma"/>
                 <a:cs typeface="Tahoma"/>
               </a:rPr>
-              <a:t>sua</a:t>
+              <a:t>dias</a:t>
             </a:r>
             <a:r>
               <a:rPr lang="en-US" sz="2000" dirty="0">
@@ -9183,6 +9233,54 @@
                 <a:ea typeface="Tahoma"/>
                 <a:cs typeface="Tahoma"/>
               </a:rPr>
+              <a:t>faltantes</a:t>
+            </a:r>
+            <a:r>
+              <a:rPr lang="en-US" sz="2000" dirty="0">
+                <a:latin typeface="Tahoma"/>
+                <a:ea typeface="Tahoma"/>
+                <a:cs typeface="Tahoma"/>
+              </a:rPr>
+              <a:t> para </a:t>
+            </a:r>
+            <a:r>
+              <a:rPr lang="en-US" sz="2000" dirty="0" err="1">
+                <a:latin typeface="Tahoma"/>
+                <a:ea typeface="Tahoma"/>
+                <a:cs typeface="Tahoma"/>
+              </a:rPr>
+              <a:t>expirar</a:t>
+            </a:r>
+            <a:r>
+              <a:rPr lang="en-US" sz="2000" dirty="0">
+                <a:latin typeface="Tahoma"/>
+                <a:ea typeface="Tahoma"/>
+                <a:cs typeface="Tahoma"/>
+              </a:rPr>
+              <a:t> o </a:t>
+            </a:r>
+            <a:r>
+              <a:rPr lang="en-US" sz="2000" dirty="0" err="1">
+                <a:latin typeface="Tahoma"/>
+                <a:ea typeface="Tahoma"/>
+                <a:cs typeface="Tahoma"/>
+              </a:rPr>
+              <a:t>período</a:t>
+            </a:r>
+            <a:r>
+              <a:rPr lang="en-US" sz="2000" dirty="0">
+                <a:latin typeface="Tahoma"/>
+                <a:ea typeface="Tahoma"/>
+                <a:cs typeface="Tahoma"/>
+              </a:rPr>
+              <a:t> de </a:t>
+            </a:r>
+            <a:r>
+              <a:rPr lang="en-US" sz="2000" dirty="0" err="1">
+                <a:latin typeface="Tahoma"/>
+                <a:ea typeface="Tahoma"/>
+                <a:cs typeface="Tahoma"/>
+              </a:rPr>
               <a:t>locação</a:t>
             </a:r>
             <a:r>
@@ -9191,31 +9289,31 @@
                 <a:ea typeface="Tahoma"/>
                 <a:cs typeface="Tahoma"/>
               </a:rPr>
-              <a:t> </a:t>
-            </a:r>
-            <a:r>
-              <a:rPr lang="en-US" sz="2000" dirty="0" err="1">
-                <a:latin typeface="Tahoma"/>
-                <a:ea typeface="Tahoma"/>
-                <a:cs typeface="Tahoma"/>
-              </a:rPr>
-              <a:t>diariamente</a:t>
-            </a:r>
-            <a:r>
-              <a:rPr lang="en-US" sz="2000" dirty="0">
-                <a:latin typeface="Tahoma"/>
-                <a:ea typeface="Tahoma"/>
-                <a:cs typeface="Tahoma"/>
-              </a:rPr>
-              <a:t>, </a:t>
-            </a:r>
-            <a:r>
-              <a:rPr lang="en-US" sz="2000" dirty="0" err="1">
-                <a:latin typeface="Tahoma"/>
-                <a:ea typeface="Tahoma"/>
-                <a:cs typeface="Tahoma"/>
-              </a:rPr>
-              <a:t>mais</a:t>
+              <a:t> do </a:t>
+            </a:r>
+            <a:r>
+              <a:rPr lang="en-US" sz="2000" dirty="0" err="1">
+                <a:latin typeface="Tahoma"/>
+                <a:ea typeface="Tahoma"/>
+                <a:cs typeface="Tahoma"/>
+              </a:rPr>
+              <a:t>filme</a:t>
+            </a:r>
+            <a:r>
+              <a:rPr lang="en-US" sz="2000" dirty="0">
+                <a:latin typeface="Tahoma"/>
+                <a:ea typeface="Tahoma"/>
+                <a:cs typeface="Tahoma"/>
+              </a:rPr>
+              <a:t>. Quando </a:t>
+            </a:r>
+            <a:r>
+              <a:rPr lang="en-US" sz="2000" dirty="0" err="1">
+                <a:latin typeface="Tahoma"/>
+                <a:ea typeface="Tahoma"/>
+                <a:cs typeface="Tahoma"/>
+              </a:rPr>
+              <a:t>esse</a:t>
             </a:r>
             <a:r>
               <a:rPr lang="en-US" sz="2000" dirty="0">
@@ -9231,23 +9329,7 @@
                 <a:ea typeface="Tahoma"/>
                 <a:cs typeface="Tahoma"/>
               </a:rPr>
-              <a:t>especificamente</a:t>
-            </a:r>
-            <a:r>
-              <a:rPr lang="en-US" sz="2000" dirty="0">
-                <a:latin typeface="Tahoma"/>
-                <a:ea typeface="Tahoma"/>
-                <a:cs typeface="Tahoma"/>
-              </a:rPr>
-              <a:t>, </a:t>
-            </a:r>
-            <a:r>
-              <a:rPr lang="en-US" sz="2000" dirty="0" err="1">
-                <a:latin typeface="Tahoma"/>
-                <a:ea typeface="Tahoma"/>
-                <a:cs typeface="Tahoma"/>
-              </a:rPr>
-              <a:t>toda</a:t>
+              <a:t>prazo</a:t>
             </a:r>
             <a:r>
               <a:rPr lang="en-US" sz="2000" dirty="0">
@@ -9263,23 +9345,135 @@
                 <a:ea typeface="Tahoma"/>
                 <a:cs typeface="Tahoma"/>
               </a:rPr>
-              <a:t>meia</a:t>
-            </a:r>
-            <a:r>
-              <a:rPr lang="en-US" sz="2000" dirty="0">
-                <a:latin typeface="Tahoma"/>
-                <a:ea typeface="Tahoma"/>
-                <a:cs typeface="Tahoma"/>
-              </a:rPr>
-              <a:t> </a:t>
-            </a:r>
-            <a:r>
-              <a:rPr lang="en-US" sz="2000" dirty="0" err="1">
-                <a:latin typeface="Tahoma"/>
-                <a:ea typeface="Tahoma"/>
-                <a:cs typeface="Tahoma"/>
-              </a:rPr>
-              <a:t>noite</a:t>
+              <a:t>acaba</a:t>
+            </a:r>
+            <a:r>
+              <a:rPr lang="en-US" sz="2000" dirty="0">
+                <a:latin typeface="Tahoma"/>
+                <a:ea typeface="Tahoma"/>
+                <a:cs typeface="Tahoma"/>
+              </a:rPr>
+              <a:t>, é </a:t>
+            </a:r>
+            <a:r>
+              <a:rPr lang="en-US" sz="2000" dirty="0" err="1">
+                <a:latin typeface="Tahoma"/>
+                <a:ea typeface="Tahoma"/>
+                <a:cs typeface="Tahoma"/>
+              </a:rPr>
+              <a:t>enviado</a:t>
+            </a:r>
+            <a:r>
+              <a:rPr lang="en-US" sz="2000" dirty="0">
+                <a:latin typeface="Tahoma"/>
+                <a:ea typeface="Tahoma"/>
+                <a:cs typeface="Tahoma"/>
+              </a:rPr>
+              <a:t> um e-mail </a:t>
+            </a:r>
+            <a:r>
+              <a:rPr lang="en-US" sz="2000" dirty="0" err="1">
+                <a:latin typeface="Tahoma"/>
+                <a:ea typeface="Tahoma"/>
+                <a:cs typeface="Tahoma"/>
+              </a:rPr>
+              <a:t>informando</a:t>
+            </a:r>
+            <a:r>
+              <a:rPr lang="en-US" sz="2000" dirty="0">
+                <a:latin typeface="Tahoma"/>
+                <a:ea typeface="Tahoma"/>
+                <a:cs typeface="Tahoma"/>
+              </a:rPr>
+              <a:t> o </a:t>
+            </a:r>
+            <a:r>
+              <a:rPr lang="en-US" sz="2000" dirty="0" err="1">
+                <a:latin typeface="Tahoma"/>
+                <a:ea typeface="Tahoma"/>
+                <a:cs typeface="Tahoma"/>
+              </a:rPr>
+              <a:t>usuário</a:t>
+            </a:r>
+            <a:r>
+              <a:rPr lang="en-US" sz="2000" dirty="0">
+                <a:latin typeface="Tahoma"/>
+                <a:ea typeface="Tahoma"/>
+                <a:cs typeface="Tahoma"/>
+              </a:rPr>
+              <a:t> e </a:t>
+            </a:r>
+            <a:r>
+              <a:rPr lang="en-US" sz="2000" dirty="0" err="1">
+                <a:latin typeface="Tahoma"/>
+                <a:ea typeface="Tahoma"/>
+                <a:cs typeface="Tahoma"/>
+              </a:rPr>
+              <a:t>recomendando</a:t>
+            </a:r>
+            <a:r>
+              <a:rPr lang="en-US" sz="2000" dirty="0">
+                <a:latin typeface="Tahoma"/>
+                <a:ea typeface="Tahoma"/>
+                <a:cs typeface="Tahoma"/>
+              </a:rPr>
+              <a:t>-o a </a:t>
+            </a:r>
+            <a:r>
+              <a:rPr lang="en-US" sz="2000" dirty="0" err="1">
+                <a:latin typeface="Tahoma"/>
+                <a:ea typeface="Tahoma"/>
+                <a:cs typeface="Tahoma"/>
+              </a:rPr>
+              <a:t>acessar</a:t>
+            </a:r>
+            <a:r>
+              <a:rPr lang="en-US" sz="2000" dirty="0">
+                <a:latin typeface="Tahoma"/>
+                <a:ea typeface="Tahoma"/>
+                <a:cs typeface="Tahoma"/>
+              </a:rPr>
+              <a:t> o </a:t>
+            </a:r>
+            <a:r>
+              <a:rPr lang="en-US" sz="2000" dirty="0" err="1">
+                <a:latin typeface="Tahoma"/>
+                <a:ea typeface="Tahoma"/>
+                <a:cs typeface="Tahoma"/>
+              </a:rPr>
+              <a:t>sistema</a:t>
+            </a:r>
+            <a:r>
+              <a:rPr lang="en-US" sz="2000" dirty="0">
+                <a:latin typeface="Tahoma"/>
+                <a:ea typeface="Tahoma"/>
+                <a:cs typeface="Tahoma"/>
+              </a:rPr>
+              <a:t> para </a:t>
+            </a:r>
+            <a:r>
+              <a:rPr lang="en-US" sz="2000" dirty="0" err="1">
+                <a:latin typeface="Tahoma"/>
+                <a:ea typeface="Tahoma"/>
+                <a:cs typeface="Tahoma"/>
+              </a:rPr>
+              <a:t>alugar</a:t>
+            </a:r>
+            <a:r>
+              <a:rPr lang="en-US" sz="2000" dirty="0">
+                <a:latin typeface="Tahoma"/>
+                <a:ea typeface="Tahoma"/>
+                <a:cs typeface="Tahoma"/>
+              </a:rPr>
+              <a:t> um novo </a:t>
+            </a:r>
+            <a:r>
+              <a:rPr lang="en-US" sz="2000" dirty="0" err="1">
+                <a:latin typeface="Tahoma"/>
+                <a:ea typeface="Tahoma"/>
+                <a:cs typeface="Tahoma"/>
+              </a:rPr>
+              <a:t>filme</a:t>
             </a:r>
             <a:r>
               <a:rPr lang="en-US" sz="2000" dirty="0">
@@ -9294,10 +9488,10 @@
       </p:sp>
       <p:pic>
         <p:nvPicPr>
-          <p:cNvPr id="3" name="Imagem 4" descr="Texto&#10;&#10;Descrição gerada automaticamente">
+          <p:cNvPr id="4" name="Imagem 4" descr="Texto&#10;&#10;Descrição gerada automaticamente">
             <a:extLst>
               <a:ext uri="{FF2B5EF4-FFF2-40B4-BE49-F238E27FC236}">
-                <a16:creationId xmlns:a16="http://schemas.microsoft.com/office/drawing/2014/main" id="{3BEE85C3-C1EE-5F34-3A25-B5F72046E1F9}"/>
+                <a16:creationId xmlns:a16="http://schemas.microsoft.com/office/drawing/2014/main" id="{8065FAE5-E495-F332-805F-5CA52F6B82CF}"/>
               </a:ext>
             </a:extLst>
           </p:cNvPr>
@@ -9314,8 +9508,8 @@
         </p:blipFill>
         <p:spPr>
           <a:xfrm>
-            <a:off x="4112917" y="2794200"/>
-            <a:ext cx="7917274" cy="1279004"/>
+            <a:off x="4298868" y="2607819"/>
+            <a:ext cx="7612082" cy="2552802"/>
           </a:xfrm>
           <a:prstGeom prst="rect">
             <a:avLst/>
@@ -10000,6 +10194,2111 @@
         </p:nvSpPr>
         <p:spPr>
           <a:xfrm>
+            <a:off x="-3648" y="1160707"/>
+            <a:ext cx="3991586" cy="3387497"/>
+          </a:xfrm>
+        </p:spPr>
+        <p:txBody>
+          <a:bodyPr anchor="b">
+            <a:normAutofit/>
+          </a:bodyPr>
+          <a:lstStyle/>
+          <a:p>
+            <a:pPr algn="ctr"/>
+            <a:r>
+              <a:rPr lang="pt-BR" sz="4000" dirty="0">
+                <a:solidFill>
+                  <a:srgbClr val="FFFFFF"/>
+                </a:solidFill>
+                <a:cs typeface="Calibri Light"/>
+              </a:rPr>
+              <a:t>Verificação para escolher qual </a:t>
+            </a:r>
+            <a:r>
+              <a:rPr lang="pt-BR" sz="4000" dirty="0" err="1">
+                <a:solidFill>
+                  <a:srgbClr val="FFFFFF"/>
+                </a:solidFill>
+                <a:cs typeface="Calibri Light"/>
+              </a:rPr>
+              <a:t>template</a:t>
+            </a:r>
+            <a:r>
+              <a:rPr lang="pt-BR" sz="4000" dirty="0">
+                <a:solidFill>
+                  <a:srgbClr val="FFFFFF"/>
+                </a:solidFill>
+                <a:cs typeface="Calibri Light"/>
+              </a:rPr>
+              <a:t> será enviado para o usuário.</a:t>
+            </a:r>
+            <a:endParaRPr lang="pt-BR" dirty="0"/>
+          </a:p>
+        </p:txBody>
+      </p:sp>
+      <p:sp>
+        <p:nvSpPr>
+          <p:cNvPr id="17" name="Espaço Reservado para Conteúdo 2">
+            <a:extLst>
+              <a:ext uri="{FF2B5EF4-FFF2-40B4-BE49-F238E27FC236}">
+                <a16:creationId xmlns:a16="http://schemas.microsoft.com/office/drawing/2014/main" id="{0DF0A389-B4E9-53A1-9848-24039F32734C}"/>
+              </a:ext>
+            </a:extLst>
+          </p:cNvPr>
+          <p:cNvSpPr>
+            <a:spLocks noGrp="1"/>
+          </p:cNvSpPr>
+          <p:nvPr>
+            <p:ph idx="1"/>
+          </p:nvPr>
+        </p:nvSpPr>
+        <p:spPr>
+          <a:xfrm>
+            <a:off x="4633240" y="810094"/>
+            <a:ext cx="6715272" cy="2327492"/>
+          </a:xfrm>
+        </p:spPr>
+        <p:txBody>
+          <a:bodyPr vert="horz" lIns="91440" tIns="45720" rIns="91440" bIns="45720" rtlCol="0" anchor="t">
+            <a:normAutofit/>
+          </a:bodyPr>
+          <a:lstStyle/>
+          <a:p>
+            <a:pPr marL="0" indent="0" algn="just">
+              <a:buNone/>
+            </a:pPr>
+            <a:r>
+              <a:rPr lang="en-US" sz="2000" dirty="0">
+                <a:latin typeface="Tahoma"/>
+                <a:ea typeface="Tahoma"/>
+                <a:cs typeface="Tahoma"/>
+              </a:rPr>
+              <a:t>Neste </a:t>
+            </a:r>
+            <a:r>
+              <a:rPr lang="en-US" sz="2000" dirty="0" err="1">
+                <a:latin typeface="Tahoma"/>
+                <a:ea typeface="Tahoma"/>
+                <a:cs typeface="Tahoma"/>
+              </a:rPr>
+              <a:t>método</a:t>
+            </a:r>
+            <a:r>
+              <a:rPr lang="en-US" sz="2000" dirty="0">
+                <a:latin typeface="Tahoma"/>
+                <a:ea typeface="Tahoma"/>
+                <a:cs typeface="Tahoma"/>
+              </a:rPr>
+              <a:t> </a:t>
+            </a:r>
+            <a:r>
+              <a:rPr lang="en-US" sz="2000" dirty="0" err="1">
+                <a:latin typeface="Tahoma"/>
+                <a:ea typeface="Tahoma"/>
+                <a:cs typeface="Tahoma"/>
+              </a:rPr>
+              <a:t>será</a:t>
+            </a:r>
+            <a:r>
+              <a:rPr lang="en-US" sz="2000" dirty="0">
+                <a:latin typeface="Tahoma"/>
+                <a:ea typeface="Tahoma"/>
+                <a:cs typeface="Tahoma"/>
+              </a:rPr>
+              <a:t> </a:t>
+            </a:r>
+            <a:r>
+              <a:rPr lang="en-US" sz="2000" dirty="0" err="1">
+                <a:latin typeface="Tahoma"/>
+                <a:ea typeface="Tahoma"/>
+                <a:cs typeface="Tahoma"/>
+              </a:rPr>
+              <a:t>verificado</a:t>
+            </a:r>
+            <a:r>
+              <a:rPr lang="en-US" sz="2000" dirty="0">
+                <a:latin typeface="Tahoma"/>
+                <a:ea typeface="Tahoma"/>
+                <a:cs typeface="Tahoma"/>
+              </a:rPr>
+              <a:t> qual template </a:t>
+            </a:r>
+            <a:r>
+              <a:rPr lang="en-US" sz="2000" dirty="0" err="1">
+                <a:latin typeface="Tahoma"/>
+                <a:ea typeface="Tahoma"/>
+                <a:cs typeface="Tahoma"/>
+              </a:rPr>
+              <a:t>será</a:t>
+            </a:r>
+            <a:r>
+              <a:rPr lang="en-US" sz="2000" dirty="0">
+                <a:latin typeface="Tahoma"/>
+                <a:ea typeface="Tahoma"/>
+                <a:cs typeface="Tahoma"/>
+              </a:rPr>
+              <a:t> </a:t>
+            </a:r>
+            <a:r>
+              <a:rPr lang="en-US" sz="2000" dirty="0" err="1">
+                <a:latin typeface="Tahoma"/>
+                <a:ea typeface="Tahoma"/>
+                <a:cs typeface="Tahoma"/>
+              </a:rPr>
+              <a:t>enviado</a:t>
+            </a:r>
+            <a:r>
+              <a:rPr lang="en-US" sz="2000" dirty="0">
+                <a:latin typeface="Tahoma"/>
+                <a:ea typeface="Tahoma"/>
+                <a:cs typeface="Tahoma"/>
+              </a:rPr>
+              <a:t> para o </a:t>
+            </a:r>
+            <a:r>
+              <a:rPr lang="en-US" sz="2000" dirty="0" err="1">
+                <a:latin typeface="Tahoma"/>
+                <a:ea typeface="Tahoma"/>
+                <a:cs typeface="Tahoma"/>
+              </a:rPr>
+              <a:t>usuário</a:t>
+            </a:r>
+            <a:r>
+              <a:rPr lang="en-US" sz="2000" dirty="0">
+                <a:latin typeface="Tahoma"/>
+                <a:ea typeface="Tahoma"/>
+                <a:cs typeface="Tahoma"/>
+              </a:rPr>
+              <a:t> de </a:t>
+            </a:r>
+            <a:r>
+              <a:rPr lang="en-US" sz="2000" dirty="0" err="1">
+                <a:latin typeface="Tahoma"/>
+                <a:ea typeface="Tahoma"/>
+                <a:cs typeface="Tahoma"/>
+              </a:rPr>
+              <a:t>acordo</a:t>
+            </a:r>
+            <a:r>
+              <a:rPr lang="en-US" sz="2000" dirty="0">
+                <a:latin typeface="Tahoma"/>
+                <a:ea typeface="Tahoma"/>
+                <a:cs typeface="Tahoma"/>
+              </a:rPr>
+              <a:t> com a </a:t>
+            </a:r>
+            <a:r>
+              <a:rPr lang="en-US" sz="2000" dirty="0" err="1">
+                <a:latin typeface="Tahoma"/>
+                <a:ea typeface="Tahoma"/>
+                <a:cs typeface="Tahoma"/>
+              </a:rPr>
+              <a:t>quantidade</a:t>
+            </a:r>
+            <a:r>
+              <a:rPr lang="en-US" sz="2000" dirty="0">
+                <a:latin typeface="Tahoma"/>
+                <a:ea typeface="Tahoma"/>
+                <a:cs typeface="Tahoma"/>
+              </a:rPr>
+              <a:t> de </a:t>
+            </a:r>
+            <a:r>
+              <a:rPr lang="en-US" sz="2000" dirty="0" err="1">
+                <a:latin typeface="Tahoma"/>
+                <a:ea typeface="Tahoma"/>
+                <a:cs typeface="Tahoma"/>
+              </a:rPr>
+              <a:t>dias</a:t>
+            </a:r>
+            <a:r>
+              <a:rPr lang="en-US" sz="2000" dirty="0">
+                <a:latin typeface="Tahoma"/>
+                <a:ea typeface="Tahoma"/>
+                <a:cs typeface="Tahoma"/>
+              </a:rPr>
+              <a:t> </a:t>
+            </a:r>
+            <a:r>
+              <a:rPr lang="en-US" sz="2000" dirty="0" err="1">
+                <a:latin typeface="Tahoma"/>
+                <a:ea typeface="Tahoma"/>
+                <a:cs typeface="Tahoma"/>
+              </a:rPr>
+              <a:t>faltantes</a:t>
+            </a:r>
+            <a:r>
+              <a:rPr lang="en-US" sz="2000" dirty="0">
+                <a:latin typeface="Tahoma"/>
+                <a:ea typeface="Tahoma"/>
+                <a:cs typeface="Tahoma"/>
+              </a:rPr>
+              <a:t> da </a:t>
+            </a:r>
+            <a:r>
+              <a:rPr lang="en-US" sz="2000" dirty="0" err="1">
+                <a:latin typeface="Tahoma"/>
+                <a:ea typeface="Tahoma"/>
+                <a:cs typeface="Tahoma"/>
+              </a:rPr>
+              <a:t>locação</a:t>
+            </a:r>
+            <a:r>
+              <a:rPr lang="en-US" sz="2000" dirty="0">
+                <a:latin typeface="Tahoma"/>
+                <a:ea typeface="Tahoma"/>
+                <a:cs typeface="Tahoma"/>
+              </a:rPr>
+              <a:t>. Para </a:t>
+            </a:r>
+            <a:r>
+              <a:rPr lang="en-US" sz="2000" dirty="0" err="1">
+                <a:latin typeface="Tahoma"/>
+                <a:ea typeface="Tahoma"/>
+                <a:cs typeface="Tahoma"/>
+              </a:rPr>
+              <a:t>quantidade</a:t>
+            </a:r>
+            <a:r>
+              <a:rPr lang="en-US" sz="2000" dirty="0">
+                <a:latin typeface="Tahoma"/>
+                <a:ea typeface="Tahoma"/>
+                <a:cs typeface="Tahoma"/>
+              </a:rPr>
+              <a:t> de </a:t>
+            </a:r>
+            <a:r>
+              <a:rPr lang="en-US" sz="2000" dirty="0" err="1">
+                <a:latin typeface="Tahoma"/>
+                <a:ea typeface="Tahoma"/>
+                <a:cs typeface="Tahoma"/>
+              </a:rPr>
+              <a:t>dias</a:t>
+            </a:r>
+            <a:r>
+              <a:rPr lang="en-US" sz="2000" dirty="0">
+                <a:latin typeface="Tahoma"/>
+                <a:ea typeface="Tahoma"/>
+                <a:cs typeface="Tahoma"/>
+              </a:rPr>
+              <a:t> </a:t>
+            </a:r>
+            <a:r>
+              <a:rPr lang="en-US" sz="2000" dirty="0" err="1">
+                <a:latin typeface="Tahoma"/>
+                <a:ea typeface="Tahoma"/>
+                <a:cs typeface="Tahoma"/>
+              </a:rPr>
+              <a:t>maior</a:t>
+            </a:r>
+            <a:r>
+              <a:rPr lang="en-US" sz="2000" dirty="0">
+                <a:latin typeface="Tahoma"/>
+                <a:ea typeface="Tahoma"/>
+                <a:cs typeface="Tahoma"/>
+              </a:rPr>
+              <a:t> do que 0, </a:t>
+            </a:r>
+            <a:r>
+              <a:rPr lang="en-US" sz="2000" dirty="0" err="1">
+                <a:latin typeface="Tahoma"/>
+                <a:ea typeface="Tahoma"/>
+                <a:cs typeface="Tahoma"/>
+              </a:rPr>
+              <a:t>será</a:t>
+            </a:r>
+            <a:r>
+              <a:rPr lang="en-US" sz="2000" dirty="0">
+                <a:latin typeface="Tahoma"/>
+                <a:ea typeface="Tahoma"/>
+                <a:cs typeface="Tahoma"/>
+              </a:rPr>
+              <a:t> </a:t>
+            </a:r>
+            <a:r>
+              <a:rPr lang="en-US" sz="2000" dirty="0" err="1">
+                <a:latin typeface="Tahoma"/>
+                <a:ea typeface="Tahoma"/>
+                <a:cs typeface="Tahoma"/>
+              </a:rPr>
+              <a:t>enviado</a:t>
+            </a:r>
+            <a:r>
+              <a:rPr lang="en-US" sz="2000" dirty="0">
+                <a:latin typeface="Tahoma"/>
+                <a:ea typeface="Tahoma"/>
+                <a:cs typeface="Tahoma"/>
+              </a:rPr>
+              <a:t> um email </a:t>
+            </a:r>
+            <a:r>
+              <a:rPr lang="en-US" sz="2000" dirty="0" err="1">
+                <a:latin typeface="Tahoma"/>
+                <a:ea typeface="Tahoma"/>
+                <a:cs typeface="Tahoma"/>
+              </a:rPr>
+              <a:t>diário</a:t>
+            </a:r>
+            <a:r>
+              <a:rPr lang="en-US" sz="2000" dirty="0">
+                <a:latin typeface="Tahoma"/>
+                <a:ea typeface="Tahoma"/>
+                <a:cs typeface="Tahoma"/>
+              </a:rPr>
+              <a:t> para </a:t>
+            </a:r>
+            <a:r>
+              <a:rPr lang="en-US" sz="2000" dirty="0" err="1">
+                <a:latin typeface="Tahoma"/>
+                <a:ea typeface="Tahoma"/>
+                <a:cs typeface="Tahoma"/>
+              </a:rPr>
+              <a:t>informar</a:t>
+            </a:r>
+            <a:r>
+              <a:rPr lang="en-US" sz="2000" dirty="0">
+                <a:latin typeface="Tahoma"/>
+                <a:ea typeface="Tahoma"/>
+                <a:cs typeface="Tahoma"/>
+              </a:rPr>
+              <a:t> </a:t>
+            </a:r>
+            <a:r>
+              <a:rPr lang="en-US" sz="2000" dirty="0" err="1">
+                <a:latin typeface="Tahoma"/>
+                <a:ea typeface="Tahoma"/>
+                <a:cs typeface="Tahoma"/>
+              </a:rPr>
+              <a:t>os</a:t>
+            </a:r>
+            <a:r>
+              <a:rPr lang="en-US" sz="2000" dirty="0">
+                <a:latin typeface="Tahoma"/>
+                <a:ea typeface="Tahoma"/>
+                <a:cs typeface="Tahoma"/>
+              </a:rPr>
+              <a:t> </a:t>
+            </a:r>
+            <a:r>
+              <a:rPr lang="en-US" sz="2000" dirty="0" err="1">
+                <a:latin typeface="Tahoma"/>
+                <a:ea typeface="Tahoma"/>
+                <a:cs typeface="Tahoma"/>
+              </a:rPr>
+              <a:t>dias</a:t>
+            </a:r>
+            <a:r>
+              <a:rPr lang="en-US" sz="2000" dirty="0">
+                <a:latin typeface="Tahoma"/>
+                <a:ea typeface="Tahoma"/>
+                <a:cs typeface="Tahoma"/>
+              </a:rPr>
+              <a:t> </a:t>
+            </a:r>
+            <a:r>
+              <a:rPr lang="en-US" sz="2000" dirty="0" err="1">
+                <a:latin typeface="Tahoma"/>
+                <a:ea typeface="Tahoma"/>
+                <a:cs typeface="Tahoma"/>
+              </a:rPr>
+              <a:t>faltantes</a:t>
+            </a:r>
+            <a:r>
+              <a:rPr lang="en-US" sz="2000" dirty="0">
+                <a:latin typeface="Tahoma"/>
+                <a:ea typeface="Tahoma"/>
+                <a:cs typeface="Tahoma"/>
+              </a:rPr>
+              <a:t> para </a:t>
+            </a:r>
+            <a:r>
+              <a:rPr lang="en-US" sz="2000" dirty="0" err="1">
+                <a:latin typeface="Tahoma"/>
+                <a:ea typeface="Tahoma"/>
+                <a:cs typeface="Tahoma"/>
+              </a:rPr>
+              <a:t>acabar</a:t>
+            </a:r>
+            <a:r>
+              <a:rPr lang="en-US" sz="2000" dirty="0">
+                <a:latin typeface="Tahoma"/>
+                <a:ea typeface="Tahoma"/>
+                <a:cs typeface="Tahoma"/>
+              </a:rPr>
+              <a:t> o </a:t>
+            </a:r>
+            <a:r>
+              <a:rPr lang="en-US" sz="2000" dirty="0" err="1">
+                <a:latin typeface="Tahoma"/>
+                <a:ea typeface="Tahoma"/>
+                <a:cs typeface="Tahoma"/>
+              </a:rPr>
+              <a:t>periodo</a:t>
+            </a:r>
+            <a:r>
+              <a:rPr lang="en-US" sz="2000" dirty="0">
+                <a:latin typeface="Tahoma"/>
+                <a:ea typeface="Tahoma"/>
+                <a:cs typeface="Tahoma"/>
+              </a:rPr>
+              <a:t> de </a:t>
+            </a:r>
+            <a:r>
+              <a:rPr lang="en-US" sz="2000" dirty="0" err="1">
+                <a:latin typeface="Tahoma"/>
+                <a:ea typeface="Tahoma"/>
+                <a:cs typeface="Tahoma"/>
+              </a:rPr>
+              <a:t>locação</a:t>
+            </a:r>
+            <a:r>
+              <a:rPr lang="en-US" sz="2000" dirty="0">
+                <a:latin typeface="Tahoma"/>
+                <a:ea typeface="Tahoma"/>
+                <a:cs typeface="Tahoma"/>
+              </a:rPr>
+              <a:t>, </a:t>
+            </a:r>
+            <a:r>
+              <a:rPr lang="en-US" sz="2000" dirty="0" err="1">
+                <a:latin typeface="Tahoma"/>
+                <a:ea typeface="Tahoma"/>
+                <a:cs typeface="Tahoma"/>
+              </a:rPr>
+              <a:t>quando</a:t>
+            </a:r>
+            <a:r>
+              <a:rPr lang="en-US" sz="2000" dirty="0">
+                <a:latin typeface="Tahoma"/>
+                <a:ea typeface="Tahoma"/>
+                <a:cs typeface="Tahoma"/>
+              </a:rPr>
+              <a:t> for </a:t>
+            </a:r>
+            <a:r>
+              <a:rPr lang="en-US" sz="2000" dirty="0" err="1">
+                <a:latin typeface="Tahoma"/>
+                <a:ea typeface="Tahoma"/>
+                <a:cs typeface="Tahoma"/>
+              </a:rPr>
+              <a:t>igual</a:t>
+            </a:r>
+            <a:r>
+              <a:rPr lang="en-US" sz="2000" dirty="0">
+                <a:latin typeface="Tahoma"/>
+                <a:ea typeface="Tahoma"/>
+                <a:cs typeface="Tahoma"/>
+              </a:rPr>
+              <a:t> a 0 </a:t>
+            </a:r>
+            <a:r>
+              <a:rPr lang="en-US" sz="2000" dirty="0" err="1">
+                <a:latin typeface="Tahoma"/>
+                <a:ea typeface="Tahoma"/>
+                <a:cs typeface="Tahoma"/>
+              </a:rPr>
+              <a:t>será</a:t>
+            </a:r>
+            <a:r>
+              <a:rPr lang="en-US" sz="2000" dirty="0">
+                <a:latin typeface="Tahoma"/>
+                <a:ea typeface="Tahoma"/>
+                <a:cs typeface="Tahoma"/>
+              </a:rPr>
+              <a:t> </a:t>
+            </a:r>
+            <a:r>
+              <a:rPr lang="en-US" sz="2000" dirty="0" err="1">
+                <a:latin typeface="Tahoma"/>
+                <a:ea typeface="Tahoma"/>
+                <a:cs typeface="Tahoma"/>
+              </a:rPr>
+              <a:t>enviado</a:t>
+            </a:r>
+            <a:r>
+              <a:rPr lang="en-US" sz="2000" dirty="0">
+                <a:latin typeface="Tahoma"/>
+                <a:ea typeface="Tahoma"/>
+                <a:cs typeface="Tahoma"/>
+              </a:rPr>
+              <a:t> um e-mail para o </a:t>
+            </a:r>
+            <a:r>
+              <a:rPr lang="en-US" sz="2000" dirty="0" err="1">
+                <a:latin typeface="Tahoma"/>
+                <a:ea typeface="Tahoma"/>
+                <a:cs typeface="Tahoma"/>
+              </a:rPr>
+              <a:t>usuário</a:t>
+            </a:r>
+            <a:r>
+              <a:rPr lang="en-US" sz="2000" dirty="0">
+                <a:latin typeface="Tahoma"/>
+                <a:ea typeface="Tahoma"/>
+                <a:cs typeface="Tahoma"/>
+              </a:rPr>
+              <a:t> </a:t>
+            </a:r>
+            <a:r>
+              <a:rPr lang="en-US" sz="2000" dirty="0" err="1">
+                <a:latin typeface="Tahoma"/>
+                <a:ea typeface="Tahoma"/>
+                <a:cs typeface="Tahoma"/>
+              </a:rPr>
+              <a:t>informando</a:t>
+            </a:r>
+            <a:r>
+              <a:rPr lang="en-US" sz="2000" dirty="0">
+                <a:latin typeface="Tahoma"/>
+                <a:ea typeface="Tahoma"/>
+                <a:cs typeface="Tahoma"/>
+              </a:rPr>
+              <a:t> que o </a:t>
+            </a:r>
+            <a:r>
+              <a:rPr lang="en-US" sz="2000" dirty="0" err="1">
+                <a:latin typeface="Tahoma"/>
+                <a:ea typeface="Tahoma"/>
+                <a:cs typeface="Tahoma"/>
+              </a:rPr>
+              <a:t>prazo</a:t>
+            </a:r>
+            <a:r>
+              <a:rPr lang="en-US" sz="2000" dirty="0">
+                <a:latin typeface="Tahoma"/>
+                <a:ea typeface="Tahoma"/>
+                <a:cs typeface="Tahoma"/>
+              </a:rPr>
+              <a:t> </a:t>
+            </a:r>
+            <a:r>
+              <a:rPr lang="en-US" sz="2000" dirty="0" err="1">
+                <a:latin typeface="Tahoma"/>
+                <a:ea typeface="Tahoma"/>
+                <a:cs typeface="Tahoma"/>
+              </a:rPr>
+              <a:t>expirou</a:t>
+            </a:r>
+            <a:r>
+              <a:rPr lang="en-US" sz="2000" dirty="0">
+                <a:latin typeface="Tahoma"/>
+                <a:ea typeface="Tahoma"/>
+                <a:cs typeface="Tahoma"/>
+              </a:rPr>
+              <a:t>.</a:t>
+            </a:r>
+          </a:p>
+        </p:txBody>
+      </p:sp>
+      <p:pic>
+        <p:nvPicPr>
+          <p:cNvPr id="3" name="Imagem 4" descr="Texto&#10;&#10;Descrição gerada automaticamente">
+            <a:extLst>
+              <a:ext uri="{FF2B5EF4-FFF2-40B4-BE49-F238E27FC236}">
+                <a16:creationId xmlns:a16="http://schemas.microsoft.com/office/drawing/2014/main" id="{2F1702F1-3CB7-5D17-4A5B-D249A2A6C5D5}"/>
+              </a:ext>
+            </a:extLst>
+          </p:cNvPr>
+          <p:cNvPicPr>
+            <a:picLocks noChangeAspect="1"/>
+          </p:cNvPicPr>
+          <p:nvPr/>
+        </p:nvPicPr>
+        <p:blipFill>
+          <a:blip r:embed="rId2"/>
+          <a:stretch>
+            <a:fillRect/>
+          </a:stretch>
+        </p:blipFill>
+        <p:spPr>
+          <a:xfrm>
+            <a:off x="4190011" y="3354287"/>
+            <a:ext cx="7819900" cy="3286489"/>
+          </a:xfrm>
+          <a:prstGeom prst="rect">
+            <a:avLst/>
+          </a:prstGeom>
+        </p:spPr>
+      </p:pic>
+    </p:spTree>
+    <p:extLst>
+      <p:ext uri="{BB962C8B-B14F-4D97-AF65-F5344CB8AC3E}">
+        <p14:creationId xmlns:p14="http://schemas.microsoft.com/office/powerpoint/2010/main" val="1965311860"/>
+      </p:ext>
+    </p:extLst>
+  </p:cSld>
+  <p:clrMapOvr>
+    <a:masterClrMapping/>
+  </p:clrMapOvr>
+</p:sld>
+</file>
+
+<file path=ppt/slides/slide16.xml><?xml version="1.0" encoding="utf-8"?>
+<p:sld xmlns:a="http://schemas.openxmlformats.org/drawingml/2006/main" xmlns:r="http://schemas.openxmlformats.org/officeDocument/2006/relationships" xmlns:p="http://schemas.openxmlformats.org/presentationml/2006/main">
+  <p:cSld>
+    <p:bg>
+      <p:bgPr>
+        <a:solidFill>
+          <a:schemeClr val="bg1"/>
+        </a:solidFill>
+        <a:effectLst/>
+      </p:bgPr>
+    </p:bg>
+    <p:spTree>
+      <p:nvGrpSpPr>
+        <p:cNvPr id="1" name=""/>
+        <p:cNvGrpSpPr/>
+        <p:nvPr/>
+      </p:nvGrpSpPr>
+      <p:grpSpPr>
+        <a:xfrm>
+          <a:off x="0" y="0"/>
+          <a:ext cx="0" cy="0"/>
+          <a:chOff x="0" y="0"/>
+          <a:chExt cx="0" cy="0"/>
+        </a:xfrm>
+      </p:grpSpPr>
+      <p:sp useBgFill="1">
+        <p:nvSpPr>
+          <p:cNvPr id="8" name="Rectangle 7">
+            <a:extLst>
+              <a:ext uri="{FF2B5EF4-FFF2-40B4-BE49-F238E27FC236}">
+                <a16:creationId xmlns:a16="http://schemas.microsoft.com/office/drawing/2014/main" id="{09588DA8-065E-4F6F-8EFD-43104AB2E0CF}"/>
+              </a:ext>
+              <a:ext uri="{C183D7F6-B498-43B3-948B-1728B52AA6E4}">
+                <adec:decorative xmlns:adec="http://schemas.microsoft.com/office/drawing/2017/decorative" val="1"/>
+              </a:ext>
+            </a:extLst>
+          </p:cNvPr>
+          <p:cNvSpPr>
+            <a:spLocks noGrp="1" noRot="1" noChangeAspect="1" noMove="1" noResize="1" noEditPoints="1" noAdjustHandles="1" noChangeArrowheads="1" noChangeShapeType="1" noTextEdit="1"/>
+          </p:cNvSpPr>
+          <p:nvPr>
+            <p:extLst>
+              <p:ext uri="{386F3935-93C4-4BCD-93E2-E3B085C9AB24}">
+                <p16:designElem xmlns:p16="http://schemas.microsoft.com/office/powerpoint/2015/main" val="1"/>
+              </p:ext>
+            </p:extLst>
+          </p:nvPr>
+        </p:nvSpPr>
+        <p:spPr>
+          <a:xfrm>
+            <a:off x="0" y="0"/>
+            <a:ext cx="12192000" cy="6858000"/>
+          </a:xfrm>
+          <a:prstGeom prst="rect">
+            <a:avLst/>
+          </a:prstGeom>
+          <a:ln w="12700" cap="flat" cmpd="sng" algn="ctr">
+            <a:noFill/>
+            <a:prstDash val="solid"/>
+            <a:miter lim="800000"/>
+          </a:ln>
+          <a:effectLst/>
+          <a:extLst>
+            <a:ext uri="{91240B29-F687-4F45-9708-019B960494DF}">
+              <a14:hiddenLine xmlns:a14="http://schemas.microsoft.com/office/drawing/2010/main" w="12700" cap="flat" cmpd="sng" algn="ctr">
+                <a:solidFill>
+                  <a:schemeClr val="accent1">
+                    <a:shade val="50000"/>
+                  </a:schemeClr>
+                </a:solidFill>
+                <a:prstDash val="solid"/>
+                <a:miter lim="800000"/>
+              </a14:hiddenLine>
+            </a:ext>
+          </a:extLst>
+        </p:spPr>
+        <p:style>
+          <a:lnRef idx="2">
+            <a:schemeClr val="accent1">
+              <a:shade val="50000"/>
+            </a:schemeClr>
+          </a:lnRef>
+          <a:fillRef idx="1">
+            <a:schemeClr val="accent1"/>
+          </a:fillRef>
+          <a:effectRef idx="0">
+            <a:schemeClr val="accent1"/>
+          </a:effectRef>
+          <a:fontRef idx="minor">
+            <a:schemeClr val="lt1"/>
+          </a:fontRef>
+        </p:style>
+        <p:txBody>
+          <a:bodyPr rtlCol="0" anchor="ctr"/>
+          <a:lstStyle/>
+          <a:p>
+            <a:pPr algn="ctr"/>
+            <a:endParaRPr lang="en-US"/>
+          </a:p>
+        </p:txBody>
+      </p:sp>
+      <p:sp useBgFill="1">
+        <p:nvSpPr>
+          <p:cNvPr id="10" name="Rectangle 9">
+            <a:extLst>
+              <a:ext uri="{FF2B5EF4-FFF2-40B4-BE49-F238E27FC236}">
+                <a16:creationId xmlns:a16="http://schemas.microsoft.com/office/drawing/2014/main" id="{C4285719-470E-454C-AF62-8323075F1F5B}"/>
+              </a:ext>
+              <a:ext uri="{C183D7F6-B498-43B3-948B-1728B52AA6E4}">
+                <adec:decorative xmlns:adec="http://schemas.microsoft.com/office/drawing/2017/decorative" val="1"/>
+              </a:ext>
+            </a:extLst>
+          </p:cNvPr>
+          <p:cNvSpPr>
+            <a:spLocks noGrp="1" noRot="1" noChangeAspect="1" noMove="1" noResize="1" noEditPoints="1" noAdjustHandles="1" noChangeArrowheads="1" noChangeShapeType="1" noTextEdit="1"/>
+          </p:cNvSpPr>
+          <p:nvPr>
+            <p:extLst>
+              <p:ext uri="{386F3935-93C4-4BCD-93E2-E3B085C9AB24}">
+                <p16:designElem xmlns:p16="http://schemas.microsoft.com/office/powerpoint/2015/main" val="1"/>
+              </p:ext>
+            </p:extLst>
+          </p:nvPr>
+        </p:nvSpPr>
+        <p:spPr>
+          <a:xfrm>
+            <a:off x="0" y="0"/>
+            <a:ext cx="12188952" cy="6858000"/>
+          </a:xfrm>
+          <a:prstGeom prst="rect">
+            <a:avLst/>
+          </a:prstGeom>
+          <a:ln w="12700" cap="flat" cmpd="sng" algn="ctr">
+            <a:noFill/>
+            <a:prstDash val="solid"/>
+            <a:miter lim="800000"/>
+          </a:ln>
+          <a:effectLst/>
+          <a:extLst>
+            <a:ext uri="{91240B29-F687-4F45-9708-019B960494DF}">
+              <a14:hiddenLine xmlns:a14="http://schemas.microsoft.com/office/drawing/2010/main" w="12700" cap="flat" cmpd="sng" algn="ctr">
+                <a:solidFill>
+                  <a:schemeClr val="accent1">
+                    <a:shade val="50000"/>
+                  </a:schemeClr>
+                </a:solidFill>
+                <a:prstDash val="solid"/>
+                <a:miter lim="800000"/>
+              </a14:hiddenLine>
+            </a:ext>
+          </a:extLst>
+        </p:spPr>
+        <p:style>
+          <a:lnRef idx="2">
+            <a:schemeClr val="accent1">
+              <a:shade val="50000"/>
+            </a:schemeClr>
+          </a:lnRef>
+          <a:fillRef idx="1">
+            <a:schemeClr val="accent1"/>
+          </a:fillRef>
+          <a:effectRef idx="0">
+            <a:schemeClr val="accent1"/>
+          </a:effectRef>
+          <a:fontRef idx="minor">
+            <a:schemeClr val="lt1"/>
+          </a:fontRef>
+        </p:style>
+        <p:txBody>
+          <a:bodyPr rtlCol="0" anchor="ctr"/>
+          <a:lstStyle/>
+          <a:p>
+            <a:pPr algn="ctr"/>
+            <a:endParaRPr lang="en-US"/>
+          </a:p>
+        </p:txBody>
+      </p:sp>
+      <p:sp>
+        <p:nvSpPr>
+          <p:cNvPr id="12" name="Rectangle 11">
+            <a:extLst>
+              <a:ext uri="{FF2B5EF4-FFF2-40B4-BE49-F238E27FC236}">
+                <a16:creationId xmlns:a16="http://schemas.microsoft.com/office/drawing/2014/main" id="{CD9FE4EF-C4D8-49A0-B2FF-81D8DB7D8A24}"/>
+              </a:ext>
+              <a:ext uri="{C183D7F6-B498-43B3-948B-1728B52AA6E4}">
+                <adec:decorative xmlns:adec="http://schemas.microsoft.com/office/drawing/2017/decorative" val="1"/>
+              </a:ext>
+            </a:extLst>
+          </p:cNvPr>
+          <p:cNvSpPr>
+            <a:spLocks noGrp="1" noRot="1" noChangeAspect="1" noMove="1" noResize="1" noEditPoints="1" noAdjustHandles="1" noChangeArrowheads="1" noChangeShapeType="1" noTextEdit="1"/>
+          </p:cNvSpPr>
+          <p:nvPr>
+            <p:extLst>
+              <p:ext uri="{386F3935-93C4-4BCD-93E2-E3B085C9AB24}">
+                <p16:designElem xmlns:p16="http://schemas.microsoft.com/office/powerpoint/2015/main" val="1"/>
+              </p:ext>
+            </p:extLst>
+          </p:nvPr>
+        </p:nvSpPr>
+        <p:spPr>
+          <a:xfrm rot="5400000" flipH="1">
+            <a:off x="-1410084" y="1410082"/>
+            <a:ext cx="6858000" cy="4037836"/>
+          </a:xfrm>
+          <a:prstGeom prst="rect">
+            <a:avLst/>
+          </a:prstGeom>
+          <a:gradFill>
+            <a:gsLst>
+              <a:gs pos="8000">
+                <a:srgbClr val="000000"/>
+              </a:gs>
+              <a:gs pos="100000">
+                <a:schemeClr val="accent1">
+                  <a:lumMod val="75000"/>
+                </a:schemeClr>
+              </a:gs>
+            </a:gsLst>
+            <a:lin ang="3000000" scaled="0"/>
+          </a:gradFill>
+          <a:ln>
+            <a:noFill/>
+          </a:ln>
+        </p:spPr>
+        <p:style>
+          <a:lnRef idx="2">
+            <a:schemeClr val="accent1">
+              <a:shade val="50000"/>
+            </a:schemeClr>
+          </a:lnRef>
+          <a:fillRef idx="1">
+            <a:schemeClr val="accent1"/>
+          </a:fillRef>
+          <a:effectRef idx="0">
+            <a:schemeClr val="accent1"/>
+          </a:effectRef>
+          <a:fontRef idx="minor">
+            <a:schemeClr val="lt1"/>
+          </a:fontRef>
+        </p:style>
+        <p:txBody>
+          <a:bodyPr rtlCol="0" anchor="ctr"/>
+          <a:lstStyle/>
+          <a:p>
+            <a:pPr algn="ctr"/>
+            <a:endParaRPr lang="en-US"/>
+          </a:p>
+        </p:txBody>
+      </p:sp>
+      <p:sp>
+        <p:nvSpPr>
+          <p:cNvPr id="14" name="Rectangle 13">
+            <a:extLst>
+              <a:ext uri="{FF2B5EF4-FFF2-40B4-BE49-F238E27FC236}">
+                <a16:creationId xmlns:a16="http://schemas.microsoft.com/office/drawing/2014/main" id="{4300840D-0A0B-4512-BACA-B439D5B9C57C}"/>
+              </a:ext>
+              <a:ext uri="{C183D7F6-B498-43B3-948B-1728B52AA6E4}">
+                <adec:decorative xmlns:adec="http://schemas.microsoft.com/office/drawing/2017/decorative" val="1"/>
+              </a:ext>
+            </a:extLst>
+          </p:cNvPr>
+          <p:cNvSpPr>
+            <a:spLocks noGrp="1" noRot="1" noChangeAspect="1" noMove="1" noResize="1" noEditPoints="1" noAdjustHandles="1" noChangeArrowheads="1" noChangeShapeType="1" noTextEdit="1"/>
+          </p:cNvSpPr>
+          <p:nvPr>
+            <p:extLst>
+              <p:ext uri="{386F3935-93C4-4BCD-93E2-E3B085C9AB24}">
+                <p16:designElem xmlns:p16="http://schemas.microsoft.com/office/powerpoint/2015/main" val="1"/>
+              </p:ext>
+            </p:extLst>
+          </p:nvPr>
+        </p:nvSpPr>
+        <p:spPr>
+          <a:xfrm rot="5400000" flipH="1">
+            <a:off x="-1410085" y="1420219"/>
+            <a:ext cx="6857999" cy="4037839"/>
+          </a:xfrm>
+          <a:prstGeom prst="rect">
+            <a:avLst/>
+          </a:prstGeom>
+          <a:gradFill>
+            <a:gsLst>
+              <a:gs pos="0">
+                <a:srgbClr val="000000">
+                  <a:alpha val="0"/>
+                </a:srgbClr>
+              </a:gs>
+              <a:gs pos="99000">
+                <a:schemeClr val="accent1">
+                  <a:alpha val="46000"/>
+                </a:schemeClr>
+              </a:gs>
+            </a:gsLst>
+            <a:lin ang="1800000" scaled="0"/>
+          </a:gradFill>
+          <a:ln>
+            <a:noFill/>
+          </a:ln>
+        </p:spPr>
+        <p:style>
+          <a:lnRef idx="2">
+            <a:schemeClr val="accent1">
+              <a:shade val="50000"/>
+            </a:schemeClr>
+          </a:lnRef>
+          <a:fillRef idx="1">
+            <a:schemeClr val="accent1"/>
+          </a:fillRef>
+          <a:effectRef idx="0">
+            <a:schemeClr val="accent1"/>
+          </a:effectRef>
+          <a:fontRef idx="minor">
+            <a:schemeClr val="lt1"/>
+          </a:fontRef>
+        </p:style>
+        <p:txBody>
+          <a:bodyPr rtlCol="0" anchor="ctr"/>
+          <a:lstStyle/>
+          <a:p>
+            <a:pPr algn="ctr"/>
+            <a:endParaRPr lang="en-US"/>
+          </a:p>
+        </p:txBody>
+      </p:sp>
+      <p:sp>
+        <p:nvSpPr>
+          <p:cNvPr id="16" name="Rectangle 15">
+            <a:extLst>
+              <a:ext uri="{FF2B5EF4-FFF2-40B4-BE49-F238E27FC236}">
+                <a16:creationId xmlns:a16="http://schemas.microsoft.com/office/drawing/2014/main" id="{D2B78728-A580-49A7-84F9-6EF6F583ADE0}"/>
+              </a:ext>
+              <a:ext uri="{C183D7F6-B498-43B3-948B-1728B52AA6E4}">
+                <adec:decorative xmlns:adec="http://schemas.microsoft.com/office/drawing/2017/decorative" val="1"/>
+              </a:ext>
+            </a:extLst>
+          </p:cNvPr>
+          <p:cNvSpPr>
+            <a:spLocks noGrp="1" noRot="1" noChangeAspect="1" noMove="1" noResize="1" noEditPoints="1" noAdjustHandles="1" noChangeArrowheads="1" noChangeShapeType="1" noTextEdit="1"/>
+          </p:cNvSpPr>
+          <p:nvPr>
+            <p:extLst>
+              <p:ext uri="{386F3935-93C4-4BCD-93E2-E3B085C9AB24}">
+                <p16:designElem xmlns:p16="http://schemas.microsoft.com/office/powerpoint/2015/main" val="1"/>
+              </p:ext>
+            </p:extLst>
+          </p:nvPr>
+        </p:nvSpPr>
+        <p:spPr>
+          <a:xfrm rot="5400000" flipH="1">
+            <a:off x="767923" y="3588085"/>
+            <a:ext cx="2501979" cy="4037841"/>
+          </a:xfrm>
+          <a:prstGeom prst="rect">
+            <a:avLst/>
+          </a:prstGeom>
+          <a:gradFill>
+            <a:gsLst>
+              <a:gs pos="2000">
+                <a:schemeClr val="accent1">
+                  <a:alpha val="29000"/>
+                </a:schemeClr>
+              </a:gs>
+              <a:gs pos="100000">
+                <a:srgbClr val="000000">
+                  <a:alpha val="30000"/>
+                </a:srgbClr>
+              </a:gs>
+            </a:gsLst>
+            <a:lin ang="7800000" scaled="0"/>
+          </a:gradFill>
+          <a:ln>
+            <a:noFill/>
+          </a:ln>
+        </p:spPr>
+        <p:style>
+          <a:lnRef idx="2">
+            <a:schemeClr val="accent1">
+              <a:shade val="50000"/>
+            </a:schemeClr>
+          </a:lnRef>
+          <a:fillRef idx="1">
+            <a:schemeClr val="accent1"/>
+          </a:fillRef>
+          <a:effectRef idx="0">
+            <a:schemeClr val="accent1"/>
+          </a:effectRef>
+          <a:fontRef idx="minor">
+            <a:schemeClr val="lt1"/>
+          </a:fontRef>
+        </p:style>
+        <p:txBody>
+          <a:bodyPr rtlCol="0" anchor="ctr"/>
+          <a:lstStyle/>
+          <a:p>
+            <a:pPr algn="ctr"/>
+            <a:endParaRPr lang="en-US" dirty="0"/>
+          </a:p>
+        </p:txBody>
+      </p:sp>
+      <p:sp>
+        <p:nvSpPr>
+          <p:cNvPr id="18" name="Freeform: Shape 17">
+            <a:extLst>
+              <a:ext uri="{FF2B5EF4-FFF2-40B4-BE49-F238E27FC236}">
+                <a16:creationId xmlns:a16="http://schemas.microsoft.com/office/drawing/2014/main" id="{38FAA1A1-D861-433F-88FA-1E9D6FD31D11}"/>
+              </a:ext>
+              <a:ext uri="{C183D7F6-B498-43B3-948B-1728B52AA6E4}">
+                <adec:decorative xmlns:adec="http://schemas.microsoft.com/office/drawing/2017/decorative" val="1"/>
+              </a:ext>
+            </a:extLst>
+          </p:cNvPr>
+          <p:cNvSpPr>
+            <a:spLocks noGrp="1" noRot="1" noChangeAspect="1" noMove="1" noResize="1" noEditPoints="1" noAdjustHandles="1" noChangeArrowheads="1" noChangeShapeType="1" noTextEdit="1"/>
+          </p:cNvSpPr>
+          <p:nvPr>
+            <p:extLst>
+              <p:ext uri="{386F3935-93C4-4BCD-93E2-E3B085C9AB24}">
+                <p16:designElem xmlns:p16="http://schemas.microsoft.com/office/powerpoint/2015/main" val="1"/>
+              </p:ext>
+            </p:extLst>
+          </p:nvPr>
+        </p:nvSpPr>
+        <p:spPr>
+          <a:xfrm rot="20635413">
+            <a:off x="-501737" y="969718"/>
+            <a:ext cx="3900357" cy="4178958"/>
+          </a:xfrm>
+          <a:custGeom>
+            <a:avLst/>
+            <a:gdLst>
+              <a:gd name="connsiteX0" fmla="*/ 2432225 w 3900357"/>
+              <a:gd name="connsiteY0" fmla="*/ 93939 h 4178958"/>
+              <a:gd name="connsiteX1" fmla="*/ 3900357 w 3900357"/>
+              <a:gd name="connsiteY1" fmla="*/ 2089479 h 4178958"/>
+              <a:gd name="connsiteX2" fmla="*/ 1810878 w 3900357"/>
+              <a:gd name="connsiteY2" fmla="*/ 4178958 h 4178958"/>
+              <a:gd name="connsiteX3" fmla="*/ 78249 w 3900357"/>
+              <a:gd name="connsiteY3" fmla="*/ 3257727 h 4178958"/>
+              <a:gd name="connsiteX4" fmla="*/ 0 w 3900357"/>
+              <a:gd name="connsiteY4" fmla="*/ 3128923 h 4178958"/>
+              <a:gd name="connsiteX5" fmla="*/ 831324 w 3900357"/>
+              <a:gd name="connsiteY5" fmla="*/ 244281 h 4178958"/>
+              <a:gd name="connsiteX6" fmla="*/ 997559 w 3900357"/>
+              <a:gd name="connsiteY6" fmla="*/ 164202 h 4178958"/>
+              <a:gd name="connsiteX7" fmla="*/ 1810878 w 3900357"/>
+              <a:gd name="connsiteY7" fmla="*/ 0 h 4178958"/>
+              <a:gd name="connsiteX8" fmla="*/ 2432225 w 3900357"/>
+              <a:gd name="connsiteY8" fmla="*/ 93939 h 4178958"/>
+            </a:gdLst>
+            <a:ahLst/>
+            <a:cxnLst>
+              <a:cxn ang="0">
+                <a:pos x="connsiteX0" y="connsiteY0"/>
+              </a:cxn>
+              <a:cxn ang="0">
+                <a:pos x="connsiteX1" y="connsiteY1"/>
+              </a:cxn>
+              <a:cxn ang="0">
+                <a:pos x="connsiteX2" y="connsiteY2"/>
+              </a:cxn>
+              <a:cxn ang="0">
+                <a:pos x="connsiteX3" y="connsiteY3"/>
+              </a:cxn>
+              <a:cxn ang="0">
+                <a:pos x="connsiteX4" y="connsiteY4"/>
+              </a:cxn>
+              <a:cxn ang="0">
+                <a:pos x="connsiteX5" y="connsiteY5"/>
+              </a:cxn>
+              <a:cxn ang="0">
+                <a:pos x="connsiteX6" y="connsiteY6"/>
+              </a:cxn>
+              <a:cxn ang="0">
+                <a:pos x="connsiteX7" y="connsiteY7"/>
+              </a:cxn>
+              <a:cxn ang="0">
+                <a:pos x="connsiteX8" y="connsiteY8"/>
+              </a:cxn>
+            </a:cxnLst>
+            <a:rect l="l" t="t" r="r" b="b"/>
+            <a:pathLst>
+              <a:path w="3900357" h="4178958">
+                <a:moveTo>
+                  <a:pt x="2432225" y="93939"/>
+                </a:moveTo>
+                <a:cubicBezTo>
+                  <a:pt x="3282786" y="358491"/>
+                  <a:pt x="3900357" y="1151865"/>
+                  <a:pt x="3900357" y="2089479"/>
+                </a:cubicBezTo>
+                <a:cubicBezTo>
+                  <a:pt x="3900357" y="3243466"/>
+                  <a:pt x="2964865" y="4178958"/>
+                  <a:pt x="1810878" y="4178958"/>
+                </a:cubicBezTo>
+                <a:cubicBezTo>
+                  <a:pt x="1089636" y="4178958"/>
+                  <a:pt x="453744" y="3813531"/>
+                  <a:pt x="78249" y="3257727"/>
+                </a:cubicBezTo>
+                <a:lnTo>
+                  <a:pt x="0" y="3128923"/>
+                </a:lnTo>
+                <a:lnTo>
+                  <a:pt x="831324" y="244281"/>
+                </a:lnTo>
+                <a:lnTo>
+                  <a:pt x="997559" y="164202"/>
+                </a:lnTo>
+                <a:cubicBezTo>
+                  <a:pt x="1247540" y="58468"/>
+                  <a:pt x="1522381" y="0"/>
+                  <a:pt x="1810878" y="0"/>
+                </a:cubicBezTo>
+                <a:cubicBezTo>
+                  <a:pt x="2027251" y="0"/>
+                  <a:pt x="2235942" y="32888"/>
+                  <a:pt x="2432225" y="93939"/>
+                </a:cubicBezTo>
+                <a:close/>
+              </a:path>
+            </a:pathLst>
+          </a:custGeom>
+          <a:gradFill>
+            <a:gsLst>
+              <a:gs pos="29000">
+                <a:srgbClr val="000000">
+                  <a:alpha val="0"/>
+                </a:srgbClr>
+              </a:gs>
+              <a:gs pos="100000">
+                <a:schemeClr val="accent1">
+                  <a:alpha val="43000"/>
+                </a:schemeClr>
+              </a:gs>
+            </a:gsLst>
+            <a:lin ang="1800000" scaled="0"/>
+          </a:gradFill>
+          <a:ln>
+            <a:noFill/>
+          </a:ln>
+        </p:spPr>
+        <p:style>
+          <a:lnRef idx="2">
+            <a:schemeClr val="accent1">
+              <a:shade val="50000"/>
+            </a:schemeClr>
+          </a:lnRef>
+          <a:fillRef idx="1">
+            <a:schemeClr val="accent1"/>
+          </a:fillRef>
+          <a:effectRef idx="0">
+            <a:schemeClr val="accent1"/>
+          </a:effectRef>
+          <a:fontRef idx="minor">
+            <a:schemeClr val="lt1"/>
+          </a:fontRef>
+        </p:style>
+        <p:txBody>
+          <a:bodyPr wrap="square" rtlCol="0" anchor="ctr">
+            <a:noAutofit/>
+          </a:bodyPr>
+          <a:lstStyle/>
+          <a:p>
+            <a:pPr algn="ctr"/>
+            <a:endParaRPr lang="en-US" dirty="0"/>
+          </a:p>
+        </p:txBody>
+      </p:sp>
+      <p:sp>
+        <p:nvSpPr>
+          <p:cNvPr id="20" name="Rectangle 19">
+            <a:extLst>
+              <a:ext uri="{FF2B5EF4-FFF2-40B4-BE49-F238E27FC236}">
+                <a16:creationId xmlns:a16="http://schemas.microsoft.com/office/drawing/2014/main" id="{8D71EDA1-87BF-4D5D-AB79-F346FD19278A}"/>
+              </a:ext>
+              <a:ext uri="{C183D7F6-B498-43B3-948B-1728B52AA6E4}">
+                <adec:decorative xmlns:adec="http://schemas.microsoft.com/office/drawing/2017/decorative" val="1"/>
+              </a:ext>
+            </a:extLst>
+          </p:cNvPr>
+          <p:cNvSpPr>
+            <a:spLocks noGrp="1" noRot="1" noChangeAspect="1" noMove="1" noResize="1" noEditPoints="1" noAdjustHandles="1" noChangeArrowheads="1" noChangeShapeType="1" noTextEdit="1"/>
+          </p:cNvSpPr>
+          <p:nvPr>
+            <p:extLst>
+              <p:ext uri="{386F3935-93C4-4BCD-93E2-E3B085C9AB24}">
+                <p16:designElem xmlns:p16="http://schemas.microsoft.com/office/powerpoint/2015/main" val="1"/>
+              </p:ext>
+            </p:extLst>
+          </p:nvPr>
+        </p:nvSpPr>
+        <p:spPr>
+          <a:xfrm rot="5400000" flipH="1">
+            <a:off x="-1410093" y="1399943"/>
+            <a:ext cx="6858003" cy="4037835"/>
+          </a:xfrm>
+          <a:prstGeom prst="rect">
+            <a:avLst/>
+          </a:prstGeom>
+          <a:gradFill>
+            <a:gsLst>
+              <a:gs pos="0">
+                <a:srgbClr val="000000">
+                  <a:alpha val="0"/>
+                </a:srgbClr>
+              </a:gs>
+              <a:gs pos="99000">
+                <a:schemeClr val="accent1">
+                  <a:lumMod val="60000"/>
+                  <a:lumOff val="40000"/>
+                  <a:alpha val="11000"/>
+                </a:schemeClr>
+              </a:gs>
+            </a:gsLst>
+            <a:lin ang="7200000" scaled="0"/>
+          </a:gradFill>
+          <a:ln>
+            <a:noFill/>
+          </a:ln>
+        </p:spPr>
+        <p:style>
+          <a:lnRef idx="2">
+            <a:schemeClr val="accent1">
+              <a:shade val="50000"/>
+            </a:schemeClr>
+          </a:lnRef>
+          <a:fillRef idx="1">
+            <a:schemeClr val="accent1"/>
+          </a:fillRef>
+          <a:effectRef idx="0">
+            <a:schemeClr val="accent1"/>
+          </a:effectRef>
+          <a:fontRef idx="minor">
+            <a:schemeClr val="lt1"/>
+          </a:fontRef>
+        </p:style>
+        <p:txBody>
+          <a:bodyPr rtlCol="0" anchor="ctr"/>
+          <a:lstStyle/>
+          <a:p>
+            <a:pPr algn="ctr"/>
+            <a:endParaRPr lang="en-US"/>
+          </a:p>
+        </p:txBody>
+      </p:sp>
+      <p:sp>
+        <p:nvSpPr>
+          <p:cNvPr id="2" name="Título 1">
+            <a:extLst>
+              <a:ext uri="{FF2B5EF4-FFF2-40B4-BE49-F238E27FC236}">
+                <a16:creationId xmlns:a16="http://schemas.microsoft.com/office/drawing/2014/main" id="{9B566D93-D2C5-B9EF-4BC3-988FE8B5C628}"/>
+              </a:ext>
+            </a:extLst>
+          </p:cNvPr>
+          <p:cNvSpPr>
+            <a:spLocks noGrp="1"/>
+          </p:cNvSpPr>
+          <p:nvPr>
+            <p:ph type="title"/>
+          </p:nvPr>
+        </p:nvSpPr>
+        <p:spPr>
+          <a:xfrm>
+            <a:off x="-3648" y="1160707"/>
+            <a:ext cx="3991586" cy="3387497"/>
+          </a:xfrm>
+        </p:spPr>
+        <p:txBody>
+          <a:bodyPr anchor="b">
+            <a:normAutofit/>
+          </a:bodyPr>
+          <a:lstStyle/>
+          <a:p>
+            <a:pPr algn="ctr"/>
+            <a:r>
+              <a:rPr lang="pt-BR" sz="4000" dirty="0">
+                <a:solidFill>
+                  <a:srgbClr val="FFFFFF"/>
+                </a:solidFill>
+                <a:cs typeface="Calibri Light"/>
+              </a:rPr>
+              <a:t>Exemplos dos e-mails enviados para os usuários.</a:t>
+            </a:r>
+            <a:endParaRPr lang="pt-BR" dirty="0"/>
+          </a:p>
+        </p:txBody>
+      </p:sp>
+      <p:sp>
+        <p:nvSpPr>
+          <p:cNvPr id="17" name="Espaço Reservado para Conteúdo 2">
+            <a:extLst>
+              <a:ext uri="{FF2B5EF4-FFF2-40B4-BE49-F238E27FC236}">
+                <a16:creationId xmlns:a16="http://schemas.microsoft.com/office/drawing/2014/main" id="{0DF0A389-B4E9-53A1-9848-24039F32734C}"/>
+              </a:ext>
+            </a:extLst>
+          </p:cNvPr>
+          <p:cNvSpPr>
+            <a:spLocks noGrp="1"/>
+          </p:cNvSpPr>
+          <p:nvPr>
+            <p:ph idx="1"/>
+          </p:nvPr>
+        </p:nvSpPr>
+        <p:spPr>
+          <a:xfrm>
+            <a:off x="4633240" y="810094"/>
+            <a:ext cx="6715272" cy="1694142"/>
+          </a:xfrm>
+        </p:spPr>
+        <p:txBody>
+          <a:bodyPr vert="horz" lIns="91440" tIns="45720" rIns="91440" bIns="45720" rtlCol="0" anchor="t">
+            <a:normAutofit/>
+          </a:bodyPr>
+          <a:lstStyle/>
+          <a:p>
+            <a:pPr marL="0" indent="0" algn="just">
+              <a:buNone/>
+            </a:pPr>
+            <a:endParaRPr lang="en-US" sz="2000" dirty="0">
+              <a:latin typeface="Tahoma"/>
+              <a:ea typeface="Tahoma"/>
+              <a:cs typeface="Tahoma"/>
+            </a:endParaRPr>
+          </a:p>
+        </p:txBody>
+      </p:sp>
+      <p:pic>
+        <p:nvPicPr>
+          <p:cNvPr id="4" name="Imagem 4" descr="Texto&#10;&#10;Descrição gerada automaticamente">
+            <a:extLst>
+              <a:ext uri="{FF2B5EF4-FFF2-40B4-BE49-F238E27FC236}">
+                <a16:creationId xmlns:a16="http://schemas.microsoft.com/office/drawing/2014/main" id="{DB57D31C-2B33-734A-448D-443C06D37898}"/>
+              </a:ext>
+            </a:extLst>
+          </p:cNvPr>
+          <p:cNvPicPr>
+            <a:picLocks noChangeAspect="1"/>
+          </p:cNvPicPr>
+          <p:nvPr/>
+        </p:nvPicPr>
+        <p:blipFill>
+          <a:blip r:embed="rId2"/>
+          <a:stretch>
+            <a:fillRect/>
+          </a:stretch>
+        </p:blipFill>
+        <p:spPr>
+          <a:xfrm>
+            <a:off x="8168244" y="1618083"/>
+            <a:ext cx="3792187" cy="3829653"/>
+          </a:xfrm>
+          <a:prstGeom prst="rect">
+            <a:avLst/>
+          </a:prstGeom>
+        </p:spPr>
+      </p:pic>
+      <p:pic>
+        <p:nvPicPr>
+          <p:cNvPr id="5" name="Imagem 5" descr="Interface gráfica do usuário, Texto&#10;&#10;Descrição gerada automaticamente">
+            <a:extLst>
+              <a:ext uri="{FF2B5EF4-FFF2-40B4-BE49-F238E27FC236}">
+                <a16:creationId xmlns:a16="http://schemas.microsoft.com/office/drawing/2014/main" id="{7D71BA2A-3FA5-E227-B671-8E05E0D692C0}"/>
+              </a:ext>
+            </a:extLst>
+          </p:cNvPr>
+          <p:cNvPicPr>
+            <a:picLocks noChangeAspect="1"/>
+          </p:cNvPicPr>
+          <p:nvPr/>
+        </p:nvPicPr>
+        <p:blipFill>
+          <a:blip r:embed="rId3"/>
+          <a:stretch>
+            <a:fillRect/>
+          </a:stretch>
+        </p:blipFill>
+        <p:spPr>
+          <a:xfrm>
+            <a:off x="4269180" y="1617233"/>
+            <a:ext cx="3643745" cy="3811559"/>
+          </a:xfrm>
+          <a:prstGeom prst="rect">
+            <a:avLst/>
+          </a:prstGeom>
+        </p:spPr>
+      </p:pic>
+    </p:spTree>
+    <p:extLst>
+      <p:ext uri="{BB962C8B-B14F-4D97-AF65-F5344CB8AC3E}">
+        <p14:creationId xmlns:p14="http://schemas.microsoft.com/office/powerpoint/2010/main" val="2257885834"/>
+      </p:ext>
+    </p:extLst>
+  </p:cSld>
+  <p:clrMapOvr>
+    <a:masterClrMapping/>
+  </p:clrMapOvr>
+</p:sld>
+</file>
+
+<file path=ppt/slides/slide17.xml><?xml version="1.0" encoding="utf-8"?>
+<p:sld xmlns:a="http://schemas.openxmlformats.org/drawingml/2006/main" xmlns:r="http://schemas.openxmlformats.org/officeDocument/2006/relationships" xmlns:p="http://schemas.openxmlformats.org/presentationml/2006/main">
+  <p:cSld>
+    <p:bg>
+      <p:bgPr>
+        <a:solidFill>
+          <a:schemeClr val="bg1"/>
+        </a:solidFill>
+        <a:effectLst/>
+      </p:bgPr>
+    </p:bg>
+    <p:spTree>
+      <p:nvGrpSpPr>
+        <p:cNvPr id="1" name=""/>
+        <p:cNvGrpSpPr/>
+        <p:nvPr/>
+      </p:nvGrpSpPr>
+      <p:grpSpPr>
+        <a:xfrm>
+          <a:off x="0" y="0"/>
+          <a:ext cx="0" cy="0"/>
+          <a:chOff x="0" y="0"/>
+          <a:chExt cx="0" cy="0"/>
+        </a:xfrm>
+      </p:grpSpPr>
+      <p:sp useBgFill="1">
+        <p:nvSpPr>
+          <p:cNvPr id="8" name="Rectangle 7">
+            <a:extLst>
+              <a:ext uri="{FF2B5EF4-FFF2-40B4-BE49-F238E27FC236}">
+                <a16:creationId xmlns:a16="http://schemas.microsoft.com/office/drawing/2014/main" id="{09588DA8-065E-4F6F-8EFD-43104AB2E0CF}"/>
+              </a:ext>
+              <a:ext uri="{C183D7F6-B498-43B3-948B-1728B52AA6E4}">
+                <adec:decorative xmlns:adec="http://schemas.microsoft.com/office/drawing/2017/decorative" val="1"/>
+              </a:ext>
+            </a:extLst>
+          </p:cNvPr>
+          <p:cNvSpPr>
+            <a:spLocks noGrp="1" noRot="1" noChangeAspect="1" noMove="1" noResize="1" noEditPoints="1" noAdjustHandles="1" noChangeArrowheads="1" noChangeShapeType="1" noTextEdit="1"/>
+          </p:cNvSpPr>
+          <p:nvPr>
+            <p:extLst>
+              <p:ext uri="{386F3935-93C4-4BCD-93E2-E3B085C9AB24}">
+                <p16:designElem xmlns:p16="http://schemas.microsoft.com/office/powerpoint/2015/main" val="1"/>
+              </p:ext>
+            </p:extLst>
+          </p:nvPr>
+        </p:nvSpPr>
+        <p:spPr>
+          <a:xfrm>
+            <a:off x="0" y="0"/>
+            <a:ext cx="12192000" cy="6858000"/>
+          </a:xfrm>
+          <a:prstGeom prst="rect">
+            <a:avLst/>
+          </a:prstGeom>
+          <a:ln w="12700" cap="flat" cmpd="sng" algn="ctr">
+            <a:noFill/>
+            <a:prstDash val="solid"/>
+            <a:miter lim="800000"/>
+          </a:ln>
+          <a:effectLst/>
+          <a:extLst>
+            <a:ext uri="{91240B29-F687-4F45-9708-019B960494DF}">
+              <a14:hiddenLine xmlns:a14="http://schemas.microsoft.com/office/drawing/2010/main" w="12700" cap="flat" cmpd="sng" algn="ctr">
+                <a:solidFill>
+                  <a:schemeClr val="accent1">
+                    <a:shade val="50000"/>
+                  </a:schemeClr>
+                </a:solidFill>
+                <a:prstDash val="solid"/>
+                <a:miter lim="800000"/>
+              </a14:hiddenLine>
+            </a:ext>
+          </a:extLst>
+        </p:spPr>
+        <p:style>
+          <a:lnRef idx="2">
+            <a:schemeClr val="accent1">
+              <a:shade val="50000"/>
+            </a:schemeClr>
+          </a:lnRef>
+          <a:fillRef idx="1">
+            <a:schemeClr val="accent1"/>
+          </a:fillRef>
+          <a:effectRef idx="0">
+            <a:schemeClr val="accent1"/>
+          </a:effectRef>
+          <a:fontRef idx="minor">
+            <a:schemeClr val="lt1"/>
+          </a:fontRef>
+        </p:style>
+        <p:txBody>
+          <a:bodyPr rtlCol="0" anchor="ctr"/>
+          <a:lstStyle/>
+          <a:p>
+            <a:pPr algn="ctr"/>
+            <a:endParaRPr lang="en-US"/>
+          </a:p>
+        </p:txBody>
+      </p:sp>
+      <p:sp useBgFill="1">
+        <p:nvSpPr>
+          <p:cNvPr id="10" name="Rectangle 9">
+            <a:extLst>
+              <a:ext uri="{FF2B5EF4-FFF2-40B4-BE49-F238E27FC236}">
+                <a16:creationId xmlns:a16="http://schemas.microsoft.com/office/drawing/2014/main" id="{C4285719-470E-454C-AF62-8323075F1F5B}"/>
+              </a:ext>
+              <a:ext uri="{C183D7F6-B498-43B3-948B-1728B52AA6E4}">
+                <adec:decorative xmlns:adec="http://schemas.microsoft.com/office/drawing/2017/decorative" val="1"/>
+              </a:ext>
+            </a:extLst>
+          </p:cNvPr>
+          <p:cNvSpPr>
+            <a:spLocks noGrp="1" noRot="1" noChangeAspect="1" noMove="1" noResize="1" noEditPoints="1" noAdjustHandles="1" noChangeArrowheads="1" noChangeShapeType="1" noTextEdit="1"/>
+          </p:cNvSpPr>
+          <p:nvPr>
+            <p:extLst>
+              <p:ext uri="{386F3935-93C4-4BCD-93E2-E3B085C9AB24}">
+                <p16:designElem xmlns:p16="http://schemas.microsoft.com/office/powerpoint/2015/main" val="1"/>
+              </p:ext>
+            </p:extLst>
+          </p:nvPr>
+        </p:nvSpPr>
+        <p:spPr>
+          <a:xfrm>
+            <a:off x="0" y="0"/>
+            <a:ext cx="12188952" cy="6858000"/>
+          </a:xfrm>
+          <a:prstGeom prst="rect">
+            <a:avLst/>
+          </a:prstGeom>
+          <a:ln w="12700" cap="flat" cmpd="sng" algn="ctr">
+            <a:noFill/>
+            <a:prstDash val="solid"/>
+            <a:miter lim="800000"/>
+          </a:ln>
+          <a:effectLst/>
+          <a:extLst>
+            <a:ext uri="{91240B29-F687-4F45-9708-019B960494DF}">
+              <a14:hiddenLine xmlns:a14="http://schemas.microsoft.com/office/drawing/2010/main" w="12700" cap="flat" cmpd="sng" algn="ctr">
+                <a:solidFill>
+                  <a:schemeClr val="accent1">
+                    <a:shade val="50000"/>
+                  </a:schemeClr>
+                </a:solidFill>
+                <a:prstDash val="solid"/>
+                <a:miter lim="800000"/>
+              </a14:hiddenLine>
+            </a:ext>
+          </a:extLst>
+        </p:spPr>
+        <p:style>
+          <a:lnRef idx="2">
+            <a:schemeClr val="accent1">
+              <a:shade val="50000"/>
+            </a:schemeClr>
+          </a:lnRef>
+          <a:fillRef idx="1">
+            <a:schemeClr val="accent1"/>
+          </a:fillRef>
+          <a:effectRef idx="0">
+            <a:schemeClr val="accent1"/>
+          </a:effectRef>
+          <a:fontRef idx="minor">
+            <a:schemeClr val="lt1"/>
+          </a:fontRef>
+        </p:style>
+        <p:txBody>
+          <a:bodyPr rtlCol="0" anchor="ctr"/>
+          <a:lstStyle/>
+          <a:p>
+            <a:pPr algn="ctr"/>
+            <a:endParaRPr lang="en-US"/>
+          </a:p>
+        </p:txBody>
+      </p:sp>
+      <p:sp>
+        <p:nvSpPr>
+          <p:cNvPr id="12" name="Rectangle 11">
+            <a:extLst>
+              <a:ext uri="{FF2B5EF4-FFF2-40B4-BE49-F238E27FC236}">
+                <a16:creationId xmlns:a16="http://schemas.microsoft.com/office/drawing/2014/main" id="{CD9FE4EF-C4D8-49A0-B2FF-81D8DB7D8A24}"/>
+              </a:ext>
+              <a:ext uri="{C183D7F6-B498-43B3-948B-1728B52AA6E4}">
+                <adec:decorative xmlns:adec="http://schemas.microsoft.com/office/drawing/2017/decorative" val="1"/>
+              </a:ext>
+            </a:extLst>
+          </p:cNvPr>
+          <p:cNvSpPr>
+            <a:spLocks noGrp="1" noRot="1" noChangeAspect="1" noMove="1" noResize="1" noEditPoints="1" noAdjustHandles="1" noChangeArrowheads="1" noChangeShapeType="1" noTextEdit="1"/>
+          </p:cNvSpPr>
+          <p:nvPr>
+            <p:extLst>
+              <p:ext uri="{386F3935-93C4-4BCD-93E2-E3B085C9AB24}">
+                <p16:designElem xmlns:p16="http://schemas.microsoft.com/office/powerpoint/2015/main" val="1"/>
+              </p:ext>
+            </p:extLst>
+          </p:nvPr>
+        </p:nvSpPr>
+        <p:spPr>
+          <a:xfrm rot="5400000" flipH="1">
+            <a:off x="-1410084" y="1410082"/>
+            <a:ext cx="6858000" cy="4037836"/>
+          </a:xfrm>
+          <a:prstGeom prst="rect">
+            <a:avLst/>
+          </a:prstGeom>
+          <a:gradFill>
+            <a:gsLst>
+              <a:gs pos="8000">
+                <a:srgbClr val="000000"/>
+              </a:gs>
+              <a:gs pos="100000">
+                <a:schemeClr val="accent1">
+                  <a:lumMod val="75000"/>
+                </a:schemeClr>
+              </a:gs>
+            </a:gsLst>
+            <a:lin ang="3000000" scaled="0"/>
+          </a:gradFill>
+          <a:ln>
+            <a:noFill/>
+          </a:ln>
+        </p:spPr>
+        <p:style>
+          <a:lnRef idx="2">
+            <a:schemeClr val="accent1">
+              <a:shade val="50000"/>
+            </a:schemeClr>
+          </a:lnRef>
+          <a:fillRef idx="1">
+            <a:schemeClr val="accent1"/>
+          </a:fillRef>
+          <a:effectRef idx="0">
+            <a:schemeClr val="accent1"/>
+          </a:effectRef>
+          <a:fontRef idx="minor">
+            <a:schemeClr val="lt1"/>
+          </a:fontRef>
+        </p:style>
+        <p:txBody>
+          <a:bodyPr rtlCol="0" anchor="ctr"/>
+          <a:lstStyle/>
+          <a:p>
+            <a:pPr algn="ctr"/>
+            <a:endParaRPr lang="en-US"/>
+          </a:p>
+        </p:txBody>
+      </p:sp>
+      <p:sp>
+        <p:nvSpPr>
+          <p:cNvPr id="14" name="Rectangle 13">
+            <a:extLst>
+              <a:ext uri="{FF2B5EF4-FFF2-40B4-BE49-F238E27FC236}">
+                <a16:creationId xmlns:a16="http://schemas.microsoft.com/office/drawing/2014/main" id="{4300840D-0A0B-4512-BACA-B439D5B9C57C}"/>
+              </a:ext>
+              <a:ext uri="{C183D7F6-B498-43B3-948B-1728B52AA6E4}">
+                <adec:decorative xmlns:adec="http://schemas.microsoft.com/office/drawing/2017/decorative" val="1"/>
+              </a:ext>
+            </a:extLst>
+          </p:cNvPr>
+          <p:cNvSpPr>
+            <a:spLocks noGrp="1" noRot="1" noChangeAspect="1" noMove="1" noResize="1" noEditPoints="1" noAdjustHandles="1" noChangeArrowheads="1" noChangeShapeType="1" noTextEdit="1"/>
+          </p:cNvSpPr>
+          <p:nvPr>
+            <p:extLst>
+              <p:ext uri="{386F3935-93C4-4BCD-93E2-E3B085C9AB24}">
+                <p16:designElem xmlns:p16="http://schemas.microsoft.com/office/powerpoint/2015/main" val="1"/>
+              </p:ext>
+            </p:extLst>
+          </p:nvPr>
+        </p:nvSpPr>
+        <p:spPr>
+          <a:xfrm rot="5400000" flipH="1">
+            <a:off x="-1410085" y="1420219"/>
+            <a:ext cx="6857999" cy="4037839"/>
+          </a:xfrm>
+          <a:prstGeom prst="rect">
+            <a:avLst/>
+          </a:prstGeom>
+          <a:gradFill>
+            <a:gsLst>
+              <a:gs pos="0">
+                <a:srgbClr val="000000">
+                  <a:alpha val="0"/>
+                </a:srgbClr>
+              </a:gs>
+              <a:gs pos="99000">
+                <a:schemeClr val="accent1">
+                  <a:alpha val="46000"/>
+                </a:schemeClr>
+              </a:gs>
+            </a:gsLst>
+            <a:lin ang="1800000" scaled="0"/>
+          </a:gradFill>
+          <a:ln>
+            <a:noFill/>
+          </a:ln>
+        </p:spPr>
+        <p:style>
+          <a:lnRef idx="2">
+            <a:schemeClr val="accent1">
+              <a:shade val="50000"/>
+            </a:schemeClr>
+          </a:lnRef>
+          <a:fillRef idx="1">
+            <a:schemeClr val="accent1"/>
+          </a:fillRef>
+          <a:effectRef idx="0">
+            <a:schemeClr val="accent1"/>
+          </a:effectRef>
+          <a:fontRef idx="minor">
+            <a:schemeClr val="lt1"/>
+          </a:fontRef>
+        </p:style>
+        <p:txBody>
+          <a:bodyPr rtlCol="0" anchor="ctr"/>
+          <a:lstStyle/>
+          <a:p>
+            <a:pPr algn="ctr"/>
+            <a:endParaRPr lang="en-US"/>
+          </a:p>
+        </p:txBody>
+      </p:sp>
+      <p:sp>
+        <p:nvSpPr>
+          <p:cNvPr id="16" name="Rectangle 15">
+            <a:extLst>
+              <a:ext uri="{FF2B5EF4-FFF2-40B4-BE49-F238E27FC236}">
+                <a16:creationId xmlns:a16="http://schemas.microsoft.com/office/drawing/2014/main" id="{D2B78728-A580-49A7-84F9-6EF6F583ADE0}"/>
+              </a:ext>
+              <a:ext uri="{C183D7F6-B498-43B3-948B-1728B52AA6E4}">
+                <adec:decorative xmlns:adec="http://schemas.microsoft.com/office/drawing/2017/decorative" val="1"/>
+              </a:ext>
+            </a:extLst>
+          </p:cNvPr>
+          <p:cNvSpPr>
+            <a:spLocks noGrp="1" noRot="1" noChangeAspect="1" noMove="1" noResize="1" noEditPoints="1" noAdjustHandles="1" noChangeArrowheads="1" noChangeShapeType="1" noTextEdit="1"/>
+          </p:cNvSpPr>
+          <p:nvPr>
+            <p:extLst>
+              <p:ext uri="{386F3935-93C4-4BCD-93E2-E3B085C9AB24}">
+                <p16:designElem xmlns:p16="http://schemas.microsoft.com/office/powerpoint/2015/main" val="1"/>
+              </p:ext>
+            </p:extLst>
+          </p:nvPr>
+        </p:nvSpPr>
+        <p:spPr>
+          <a:xfrm rot="5400000" flipH="1">
+            <a:off x="767923" y="3588085"/>
+            <a:ext cx="2501979" cy="4037841"/>
+          </a:xfrm>
+          <a:prstGeom prst="rect">
+            <a:avLst/>
+          </a:prstGeom>
+          <a:gradFill>
+            <a:gsLst>
+              <a:gs pos="2000">
+                <a:schemeClr val="accent1">
+                  <a:alpha val="29000"/>
+                </a:schemeClr>
+              </a:gs>
+              <a:gs pos="100000">
+                <a:srgbClr val="000000">
+                  <a:alpha val="30000"/>
+                </a:srgbClr>
+              </a:gs>
+            </a:gsLst>
+            <a:lin ang="7800000" scaled="0"/>
+          </a:gradFill>
+          <a:ln>
+            <a:noFill/>
+          </a:ln>
+        </p:spPr>
+        <p:style>
+          <a:lnRef idx="2">
+            <a:schemeClr val="accent1">
+              <a:shade val="50000"/>
+            </a:schemeClr>
+          </a:lnRef>
+          <a:fillRef idx="1">
+            <a:schemeClr val="accent1"/>
+          </a:fillRef>
+          <a:effectRef idx="0">
+            <a:schemeClr val="accent1"/>
+          </a:effectRef>
+          <a:fontRef idx="minor">
+            <a:schemeClr val="lt1"/>
+          </a:fontRef>
+        </p:style>
+        <p:txBody>
+          <a:bodyPr rtlCol="0" anchor="ctr"/>
+          <a:lstStyle/>
+          <a:p>
+            <a:pPr algn="ctr"/>
+            <a:endParaRPr lang="en-US" dirty="0"/>
+          </a:p>
+        </p:txBody>
+      </p:sp>
+      <p:sp>
+        <p:nvSpPr>
+          <p:cNvPr id="18" name="Freeform: Shape 17">
+            <a:extLst>
+              <a:ext uri="{FF2B5EF4-FFF2-40B4-BE49-F238E27FC236}">
+                <a16:creationId xmlns:a16="http://schemas.microsoft.com/office/drawing/2014/main" id="{38FAA1A1-D861-433F-88FA-1E9D6FD31D11}"/>
+              </a:ext>
+              <a:ext uri="{C183D7F6-B498-43B3-948B-1728B52AA6E4}">
+                <adec:decorative xmlns:adec="http://schemas.microsoft.com/office/drawing/2017/decorative" val="1"/>
+              </a:ext>
+            </a:extLst>
+          </p:cNvPr>
+          <p:cNvSpPr>
+            <a:spLocks noGrp="1" noRot="1" noChangeAspect="1" noMove="1" noResize="1" noEditPoints="1" noAdjustHandles="1" noChangeArrowheads="1" noChangeShapeType="1" noTextEdit="1"/>
+          </p:cNvSpPr>
+          <p:nvPr>
+            <p:extLst>
+              <p:ext uri="{386F3935-93C4-4BCD-93E2-E3B085C9AB24}">
+                <p16:designElem xmlns:p16="http://schemas.microsoft.com/office/powerpoint/2015/main" val="1"/>
+              </p:ext>
+            </p:extLst>
+          </p:nvPr>
+        </p:nvSpPr>
+        <p:spPr>
+          <a:xfrm rot="20635413">
+            <a:off x="-501737" y="969718"/>
+            <a:ext cx="3900357" cy="4178958"/>
+          </a:xfrm>
+          <a:custGeom>
+            <a:avLst/>
+            <a:gdLst>
+              <a:gd name="connsiteX0" fmla="*/ 2432225 w 3900357"/>
+              <a:gd name="connsiteY0" fmla="*/ 93939 h 4178958"/>
+              <a:gd name="connsiteX1" fmla="*/ 3900357 w 3900357"/>
+              <a:gd name="connsiteY1" fmla="*/ 2089479 h 4178958"/>
+              <a:gd name="connsiteX2" fmla="*/ 1810878 w 3900357"/>
+              <a:gd name="connsiteY2" fmla="*/ 4178958 h 4178958"/>
+              <a:gd name="connsiteX3" fmla="*/ 78249 w 3900357"/>
+              <a:gd name="connsiteY3" fmla="*/ 3257727 h 4178958"/>
+              <a:gd name="connsiteX4" fmla="*/ 0 w 3900357"/>
+              <a:gd name="connsiteY4" fmla="*/ 3128923 h 4178958"/>
+              <a:gd name="connsiteX5" fmla="*/ 831324 w 3900357"/>
+              <a:gd name="connsiteY5" fmla="*/ 244281 h 4178958"/>
+              <a:gd name="connsiteX6" fmla="*/ 997559 w 3900357"/>
+              <a:gd name="connsiteY6" fmla="*/ 164202 h 4178958"/>
+              <a:gd name="connsiteX7" fmla="*/ 1810878 w 3900357"/>
+              <a:gd name="connsiteY7" fmla="*/ 0 h 4178958"/>
+              <a:gd name="connsiteX8" fmla="*/ 2432225 w 3900357"/>
+              <a:gd name="connsiteY8" fmla="*/ 93939 h 4178958"/>
+            </a:gdLst>
+            <a:ahLst/>
+            <a:cxnLst>
+              <a:cxn ang="0">
+                <a:pos x="connsiteX0" y="connsiteY0"/>
+              </a:cxn>
+              <a:cxn ang="0">
+                <a:pos x="connsiteX1" y="connsiteY1"/>
+              </a:cxn>
+              <a:cxn ang="0">
+                <a:pos x="connsiteX2" y="connsiteY2"/>
+              </a:cxn>
+              <a:cxn ang="0">
+                <a:pos x="connsiteX3" y="connsiteY3"/>
+              </a:cxn>
+              <a:cxn ang="0">
+                <a:pos x="connsiteX4" y="connsiteY4"/>
+              </a:cxn>
+              <a:cxn ang="0">
+                <a:pos x="connsiteX5" y="connsiteY5"/>
+              </a:cxn>
+              <a:cxn ang="0">
+                <a:pos x="connsiteX6" y="connsiteY6"/>
+              </a:cxn>
+              <a:cxn ang="0">
+                <a:pos x="connsiteX7" y="connsiteY7"/>
+              </a:cxn>
+              <a:cxn ang="0">
+                <a:pos x="connsiteX8" y="connsiteY8"/>
+              </a:cxn>
+            </a:cxnLst>
+            <a:rect l="l" t="t" r="r" b="b"/>
+            <a:pathLst>
+              <a:path w="3900357" h="4178958">
+                <a:moveTo>
+                  <a:pt x="2432225" y="93939"/>
+                </a:moveTo>
+                <a:cubicBezTo>
+                  <a:pt x="3282786" y="358491"/>
+                  <a:pt x="3900357" y="1151865"/>
+                  <a:pt x="3900357" y="2089479"/>
+                </a:cubicBezTo>
+                <a:cubicBezTo>
+                  <a:pt x="3900357" y="3243466"/>
+                  <a:pt x="2964865" y="4178958"/>
+                  <a:pt x="1810878" y="4178958"/>
+                </a:cubicBezTo>
+                <a:cubicBezTo>
+                  <a:pt x="1089636" y="4178958"/>
+                  <a:pt x="453744" y="3813531"/>
+                  <a:pt x="78249" y="3257727"/>
+                </a:cubicBezTo>
+                <a:lnTo>
+                  <a:pt x="0" y="3128923"/>
+                </a:lnTo>
+                <a:lnTo>
+                  <a:pt x="831324" y="244281"/>
+                </a:lnTo>
+                <a:lnTo>
+                  <a:pt x="997559" y="164202"/>
+                </a:lnTo>
+                <a:cubicBezTo>
+                  <a:pt x="1247540" y="58468"/>
+                  <a:pt x="1522381" y="0"/>
+                  <a:pt x="1810878" y="0"/>
+                </a:cubicBezTo>
+                <a:cubicBezTo>
+                  <a:pt x="2027251" y="0"/>
+                  <a:pt x="2235942" y="32888"/>
+                  <a:pt x="2432225" y="93939"/>
+                </a:cubicBezTo>
+                <a:close/>
+              </a:path>
+            </a:pathLst>
+          </a:custGeom>
+          <a:gradFill>
+            <a:gsLst>
+              <a:gs pos="29000">
+                <a:srgbClr val="000000">
+                  <a:alpha val="0"/>
+                </a:srgbClr>
+              </a:gs>
+              <a:gs pos="100000">
+                <a:schemeClr val="accent1">
+                  <a:alpha val="43000"/>
+                </a:schemeClr>
+              </a:gs>
+            </a:gsLst>
+            <a:lin ang="1800000" scaled="0"/>
+          </a:gradFill>
+          <a:ln>
+            <a:noFill/>
+          </a:ln>
+        </p:spPr>
+        <p:style>
+          <a:lnRef idx="2">
+            <a:schemeClr val="accent1">
+              <a:shade val="50000"/>
+            </a:schemeClr>
+          </a:lnRef>
+          <a:fillRef idx="1">
+            <a:schemeClr val="accent1"/>
+          </a:fillRef>
+          <a:effectRef idx="0">
+            <a:schemeClr val="accent1"/>
+          </a:effectRef>
+          <a:fontRef idx="minor">
+            <a:schemeClr val="lt1"/>
+          </a:fontRef>
+        </p:style>
+        <p:txBody>
+          <a:bodyPr wrap="square" rtlCol="0" anchor="ctr">
+            <a:noAutofit/>
+          </a:bodyPr>
+          <a:lstStyle/>
+          <a:p>
+            <a:pPr algn="ctr"/>
+            <a:endParaRPr lang="en-US" dirty="0"/>
+          </a:p>
+        </p:txBody>
+      </p:sp>
+      <p:sp>
+        <p:nvSpPr>
+          <p:cNvPr id="20" name="Rectangle 19">
+            <a:extLst>
+              <a:ext uri="{FF2B5EF4-FFF2-40B4-BE49-F238E27FC236}">
+                <a16:creationId xmlns:a16="http://schemas.microsoft.com/office/drawing/2014/main" id="{8D71EDA1-87BF-4D5D-AB79-F346FD19278A}"/>
+              </a:ext>
+              <a:ext uri="{C183D7F6-B498-43B3-948B-1728B52AA6E4}">
+                <adec:decorative xmlns:adec="http://schemas.microsoft.com/office/drawing/2017/decorative" val="1"/>
+              </a:ext>
+            </a:extLst>
+          </p:cNvPr>
+          <p:cNvSpPr>
+            <a:spLocks noGrp="1" noRot="1" noChangeAspect="1" noMove="1" noResize="1" noEditPoints="1" noAdjustHandles="1" noChangeArrowheads="1" noChangeShapeType="1" noTextEdit="1"/>
+          </p:cNvSpPr>
+          <p:nvPr>
+            <p:extLst>
+              <p:ext uri="{386F3935-93C4-4BCD-93E2-E3B085C9AB24}">
+                <p16:designElem xmlns:p16="http://schemas.microsoft.com/office/powerpoint/2015/main" val="1"/>
+              </p:ext>
+            </p:extLst>
+          </p:nvPr>
+        </p:nvSpPr>
+        <p:spPr>
+          <a:xfrm rot="5400000" flipH="1">
+            <a:off x="-1410093" y="1399943"/>
+            <a:ext cx="6858003" cy="4037835"/>
+          </a:xfrm>
+          <a:prstGeom prst="rect">
+            <a:avLst/>
+          </a:prstGeom>
+          <a:gradFill>
+            <a:gsLst>
+              <a:gs pos="0">
+                <a:srgbClr val="000000">
+                  <a:alpha val="0"/>
+                </a:srgbClr>
+              </a:gs>
+              <a:gs pos="99000">
+                <a:schemeClr val="accent1">
+                  <a:lumMod val="60000"/>
+                  <a:lumOff val="40000"/>
+                  <a:alpha val="11000"/>
+                </a:schemeClr>
+              </a:gs>
+            </a:gsLst>
+            <a:lin ang="7200000" scaled="0"/>
+          </a:gradFill>
+          <a:ln>
+            <a:noFill/>
+          </a:ln>
+        </p:spPr>
+        <p:style>
+          <a:lnRef idx="2">
+            <a:schemeClr val="accent1">
+              <a:shade val="50000"/>
+            </a:schemeClr>
+          </a:lnRef>
+          <a:fillRef idx="1">
+            <a:schemeClr val="accent1"/>
+          </a:fillRef>
+          <a:effectRef idx="0">
+            <a:schemeClr val="accent1"/>
+          </a:effectRef>
+          <a:fontRef idx="minor">
+            <a:schemeClr val="lt1"/>
+          </a:fontRef>
+        </p:style>
+        <p:txBody>
+          <a:bodyPr rtlCol="0" anchor="ctr"/>
+          <a:lstStyle/>
+          <a:p>
+            <a:pPr algn="ctr"/>
+            <a:endParaRPr lang="en-US"/>
+          </a:p>
+        </p:txBody>
+      </p:sp>
+      <p:sp>
+        <p:nvSpPr>
+          <p:cNvPr id="2" name="Título 1">
+            <a:extLst>
+              <a:ext uri="{FF2B5EF4-FFF2-40B4-BE49-F238E27FC236}">
+                <a16:creationId xmlns:a16="http://schemas.microsoft.com/office/drawing/2014/main" id="{9B566D93-D2C5-B9EF-4BC3-988FE8B5C628}"/>
+              </a:ext>
+            </a:extLst>
+          </p:cNvPr>
+          <p:cNvSpPr>
+            <a:spLocks noGrp="1"/>
+          </p:cNvSpPr>
+          <p:nvPr>
+            <p:ph type="title"/>
+          </p:nvPr>
+        </p:nvSpPr>
+        <p:spPr>
+          <a:xfrm>
             <a:off x="-22463" y="2581225"/>
             <a:ext cx="3991586" cy="1195572"/>
           </a:xfrm>
@@ -11569,7 +13868,7 @@
 </p:sld>
 </file>
 
-<file path=ppt/slides/slide16.xml><?xml version="1.0" encoding="utf-8"?>
+<file path=ppt/slides/slide18.xml><?xml version="1.0" encoding="utf-8"?>
 <p:sld xmlns:a="http://schemas.openxmlformats.org/drawingml/2006/main" xmlns:r="http://schemas.openxmlformats.org/officeDocument/2006/relationships" xmlns:p="http://schemas.openxmlformats.org/presentationml/2006/main">
   <p:cSld>
     <p:bg>
@@ -18948,26 +21247,6 @@
 </file>
 
 <file path=customXml/item1.xml><?xml version="1.0" encoding="utf-8"?>
-<p:properties xmlns:p="http://schemas.microsoft.com/office/2006/metadata/properties" xmlns:xsi="http://www.w3.org/2001/XMLSchema-instance" xmlns:pc="http://schemas.microsoft.com/office/infopath/2007/PartnerControls">
-  <documentManagement>
-    <TaxCatchAll xmlns="62088385-7b90-423d-9897-008bbd2138f2" xsi:nil="true"/>
-    <lcf76f155ced4ddcb4097134ff3c332f xmlns="d0539b1e-24e3-4548-b6a7-dc9758981ff7">
-      <Terms xmlns="http://schemas.microsoft.com/office/infopath/2007/PartnerControls"/>
-    </lcf76f155ced4ddcb4097134ff3c332f>
-  </documentManagement>
-</p:properties>
-</file>
-
-<file path=customXml/item2.xml><?xml version="1.0" encoding="utf-8"?>
-<?mso-contentType ?>
-<FormTemplates xmlns="http://schemas.microsoft.com/sharepoint/v3/contenttype/forms">
-  <Display>DocumentLibraryForm</Display>
-  <Edit>DocumentLibraryForm</Edit>
-  <New>DocumentLibraryForm</New>
-</FormTemplates>
-</file>
-
-<file path=customXml/item3.xml><?xml version="1.0" encoding="utf-8"?>
 <ct:contentTypeSchema xmlns:ct="http://schemas.microsoft.com/office/2006/metadata/contentType" xmlns:ma="http://schemas.microsoft.com/office/2006/metadata/properties/metaAttributes" ct:_="" ma:_="" ma:contentTypeName="Documento" ma:contentTypeID="0x010100385ACDE743314A41A2F79E09709D2DD7" ma:contentTypeVersion="16" ma:contentTypeDescription="Criar um novo documento." ma:contentTypeScope="" ma:versionID="c6772b84407fd5560125daf70d8e8b5e">
   <xsd:schema xmlns:xsd="http://www.w3.org/2001/XMLSchema" xmlns:xs="http://www.w3.org/2001/XMLSchema" xmlns:p="http://schemas.microsoft.com/office/2006/metadata/properties" xmlns:ns2="d0539b1e-24e3-4548-b6a7-dc9758981ff7" xmlns:ns3="62088385-7b90-423d-9897-008bbd2138f2" targetNamespace="http://schemas.microsoft.com/office/2006/metadata/properties" ma:root="true" ma:fieldsID="37abd50379a88288e61ed819e1db83fd" ns2:_="" ns3:_="">
     <xsd:import namespace="d0539b1e-24e3-4548-b6a7-dc9758981ff7"/>
@@ -19210,26 +21489,27 @@
 </ct:contentTypeSchema>
 </file>
 
-<file path=customXml/itemProps1.xml><?xml version="1.0" encoding="utf-8"?>
-<ds:datastoreItem xmlns:ds="http://schemas.openxmlformats.org/officeDocument/2006/customXml" ds:itemID="{CCE49D02-A7CC-4849-8946-AA322C469DA0}">
-  <ds:schemaRefs>
-    <ds:schemaRef ds:uri="62088385-7b90-423d-9897-008bbd2138f2"/>
-    <ds:schemaRef ds:uri="d0539b1e-24e3-4548-b6a7-dc9758981ff7"/>
-    <ds:schemaRef ds:uri="http://schemas.microsoft.com/office/2006/metadata/properties"/>
-    <ds:schemaRef ds:uri="http://schemas.microsoft.com/office/infopath/2007/PartnerControls"/>
-  </ds:schemaRefs>
-</ds:datastoreItem>
+<file path=customXml/item2.xml><?xml version="1.0" encoding="utf-8"?>
+<?mso-contentType ?>
+<FormTemplates xmlns="http://schemas.microsoft.com/sharepoint/v3/contenttype/forms">
+  <Display>DocumentLibraryForm</Display>
+  <Edit>DocumentLibraryForm</Edit>
+  <New>DocumentLibraryForm</New>
+</FormTemplates>
 </file>
 
-<file path=customXml/itemProps2.xml><?xml version="1.0" encoding="utf-8"?>
-<ds:datastoreItem xmlns:ds="http://schemas.openxmlformats.org/officeDocument/2006/customXml" ds:itemID="{DCAEF609-C504-47F8-8964-F1C39A1D0C1B}">
-  <ds:schemaRefs>
-    <ds:schemaRef ds:uri="http://schemas.microsoft.com/sharepoint/v3/contenttype/forms"/>
-  </ds:schemaRefs>
-</ds:datastoreItem>
+<file path=customXml/item3.xml><?xml version="1.0" encoding="utf-8"?>
+<p:properties xmlns:p="http://schemas.microsoft.com/office/2006/metadata/properties" xmlns:xsi="http://www.w3.org/2001/XMLSchema-instance" xmlns:pc="http://schemas.microsoft.com/office/infopath/2007/PartnerControls">
+  <documentManagement>
+    <TaxCatchAll xmlns="62088385-7b90-423d-9897-008bbd2138f2" xsi:nil="true"/>
+    <lcf76f155ced4ddcb4097134ff3c332f xmlns="d0539b1e-24e3-4548-b6a7-dc9758981ff7">
+      <Terms xmlns="http://schemas.microsoft.com/office/infopath/2007/PartnerControls"/>
+    </lcf76f155ced4ddcb4097134ff3c332f>
+  </documentManagement>
+</p:properties>
 </file>
 
-<file path=customXml/itemProps3.xml><?xml version="1.0" encoding="utf-8"?>
+<file path=customXml/itemProps1.xml><?xml version="1.0" encoding="utf-8"?>
 <ds:datastoreItem xmlns:ds="http://schemas.openxmlformats.org/officeDocument/2006/customXml" ds:itemID="{A18D07F4-93F7-457B-9F30-6F345DCEA5F9}">
   <ds:schemaRefs>
     <ds:schemaRef ds:uri="62088385-7b90-423d-9897-008bbd2138f2"/>
@@ -19246,4 +21526,23 @@
     <ds:schemaRef ds:uri="http://www.w3.org/2001/XMLSchema"/>
   </ds:schemaRefs>
 </ds:datastoreItem>
+</file>
+
+<file path=customXml/itemProps2.xml><?xml version="1.0" encoding="utf-8"?>
+<ds:datastoreItem xmlns:ds="http://schemas.openxmlformats.org/officeDocument/2006/customXml" ds:itemID="{DCAEF609-C504-47F8-8964-F1C39A1D0C1B}">
+  <ds:schemaRefs>
+    <ds:schemaRef ds:uri="http://schemas.microsoft.com/sharepoint/v3/contenttype/forms"/>
+  </ds:schemaRefs>
+</ds:datastoreItem>
+</file>
+
+<file path=customXml/itemProps3.xml><?xml version="1.0" encoding="utf-8"?>
+<ds:datastoreItem xmlns:ds="http://schemas.openxmlformats.org/officeDocument/2006/customXml" ds:itemID="{CCE49D02-A7CC-4849-8946-AA322C469DA0}">
+  <ds:schemaRefs>
+    <ds:schemaRef ds:uri="62088385-7b90-423d-9897-008bbd2138f2"/>
+    <ds:schemaRef ds:uri="d0539b1e-24e3-4548-b6a7-dc9758981ff7"/>
+    <ds:schemaRef ds:uri="http://schemas.microsoft.com/office/2006/metadata/properties"/>
+    <ds:schemaRef ds:uri="http://schemas.microsoft.com/office/infopath/2007/PartnerControls"/>
+  </ds:schemaRefs>
+</ds:datastoreItem>
 </file>
</xml_diff>